<commit_message>
Fleshing out logical overview and system design
</commit_message>
<xml_diff>
--- a/docs/Yale MCP.pptx
+++ b/docs/Yale MCP.pptx
@@ -262,7 +262,7 @@
           <a:p>
             <a:fld id="{376E7E80-D09A-4A29-92F7-BFBF497E4A0B}" type="datetimeFigureOut">
               <a:rPr lang="en-US" smtClean="0"/>
-              <a:t>10/26/2022</a:t>
+              <a:t>12/16/2022</a:t>
             </a:fld>
             <a:endParaRPr lang="en-US"/>
           </a:p>
@@ -460,7 +460,7 @@
           <a:p>
             <a:fld id="{376E7E80-D09A-4A29-92F7-BFBF497E4A0B}" type="datetimeFigureOut">
               <a:rPr lang="en-US" smtClean="0"/>
-              <a:t>10/26/2022</a:t>
+              <a:t>12/16/2022</a:t>
             </a:fld>
             <a:endParaRPr lang="en-US"/>
           </a:p>
@@ -668,7 +668,7 @@
           <a:p>
             <a:fld id="{376E7E80-D09A-4A29-92F7-BFBF497E4A0B}" type="datetimeFigureOut">
               <a:rPr lang="en-US" smtClean="0"/>
-              <a:t>10/26/2022</a:t>
+              <a:t>12/16/2022</a:t>
             </a:fld>
             <a:endParaRPr lang="en-US"/>
           </a:p>
@@ -866,7 +866,7 @@
           <a:p>
             <a:fld id="{376E7E80-D09A-4A29-92F7-BFBF497E4A0B}" type="datetimeFigureOut">
               <a:rPr lang="en-US" smtClean="0"/>
-              <a:t>10/26/2022</a:t>
+              <a:t>12/16/2022</a:t>
             </a:fld>
             <a:endParaRPr lang="en-US"/>
           </a:p>
@@ -1141,7 +1141,7 @@
           <a:p>
             <a:fld id="{376E7E80-D09A-4A29-92F7-BFBF497E4A0B}" type="datetimeFigureOut">
               <a:rPr lang="en-US" smtClean="0"/>
-              <a:t>10/26/2022</a:t>
+              <a:t>12/16/2022</a:t>
             </a:fld>
             <a:endParaRPr lang="en-US"/>
           </a:p>
@@ -1406,7 +1406,7 @@
           <a:p>
             <a:fld id="{376E7E80-D09A-4A29-92F7-BFBF497E4A0B}" type="datetimeFigureOut">
               <a:rPr lang="en-US" smtClean="0"/>
-              <a:t>10/26/2022</a:t>
+              <a:t>12/16/2022</a:t>
             </a:fld>
             <a:endParaRPr lang="en-US"/>
           </a:p>
@@ -1818,7 +1818,7 @@
           <a:p>
             <a:fld id="{376E7E80-D09A-4A29-92F7-BFBF497E4A0B}" type="datetimeFigureOut">
               <a:rPr lang="en-US" smtClean="0"/>
-              <a:t>10/26/2022</a:t>
+              <a:t>12/16/2022</a:t>
             </a:fld>
             <a:endParaRPr lang="en-US"/>
           </a:p>
@@ -1959,7 +1959,7 @@
           <a:p>
             <a:fld id="{376E7E80-D09A-4A29-92F7-BFBF497E4A0B}" type="datetimeFigureOut">
               <a:rPr lang="en-US" smtClean="0"/>
-              <a:t>10/26/2022</a:t>
+              <a:t>12/16/2022</a:t>
             </a:fld>
             <a:endParaRPr lang="en-US"/>
           </a:p>
@@ -2072,7 +2072,7 @@
           <a:p>
             <a:fld id="{376E7E80-D09A-4A29-92F7-BFBF497E4A0B}" type="datetimeFigureOut">
               <a:rPr lang="en-US" smtClean="0"/>
-              <a:t>10/26/2022</a:t>
+              <a:t>12/16/2022</a:t>
             </a:fld>
             <a:endParaRPr lang="en-US"/>
           </a:p>
@@ -2383,7 +2383,7 @@
           <a:p>
             <a:fld id="{376E7E80-D09A-4A29-92F7-BFBF497E4A0B}" type="datetimeFigureOut">
               <a:rPr lang="en-US" smtClean="0"/>
-              <a:t>10/26/2022</a:t>
+              <a:t>12/16/2022</a:t>
             </a:fld>
             <a:endParaRPr lang="en-US"/>
           </a:p>
@@ -2671,7 +2671,7 @@
           <a:p>
             <a:fld id="{376E7E80-D09A-4A29-92F7-BFBF497E4A0B}" type="datetimeFigureOut">
               <a:rPr lang="en-US" smtClean="0"/>
-              <a:t>10/26/2022</a:t>
+              <a:t>12/16/2022</a:t>
             </a:fld>
             <a:endParaRPr lang="en-US"/>
           </a:p>
@@ -2912,7 +2912,7 @@
           <a:p>
             <a:fld id="{376E7E80-D09A-4A29-92F7-BFBF497E4A0B}" type="datetimeFigureOut">
               <a:rPr lang="en-US" smtClean="0"/>
-              <a:t>10/26/2022</a:t>
+              <a:t>12/16/2022</a:t>
             </a:fld>
             <a:endParaRPr lang="en-US"/>
           </a:p>

</xml_diff>

<commit_message>
Added UI roughs to MCP diagrams deck
</commit_message>
<xml_diff>
--- a/docs/Yale MCP.pptx
+++ b/docs/Yale MCP.pptx
@@ -9,6 +9,11 @@
     <p:sldId id="257" r:id="rId3"/>
     <p:sldId id="258" r:id="rId4"/>
     <p:sldId id="259" r:id="rId5"/>
+    <p:sldId id="261" r:id="rId6"/>
+    <p:sldId id="260" r:id="rId7"/>
+    <p:sldId id="262" r:id="rId8"/>
+    <p:sldId id="263" r:id="rId9"/>
+    <p:sldId id="264" r:id="rId10"/>
   </p:sldIdLst>
   <p:sldSz cx="12192000" cy="6858000"/>
   <p:notesSz cx="6858000" cy="9144000"/>
@@ -262,7 +267,7 @@
           <a:p>
             <a:fld id="{376E7E80-D09A-4A29-92F7-BFBF497E4A0B}" type="datetimeFigureOut">
               <a:rPr lang="en-US" smtClean="0"/>
-              <a:t>12/16/2022</a:t>
+              <a:t>2/21/2023</a:t>
             </a:fld>
             <a:endParaRPr lang="en-US"/>
           </a:p>
@@ -460,7 +465,7 @@
           <a:p>
             <a:fld id="{376E7E80-D09A-4A29-92F7-BFBF497E4A0B}" type="datetimeFigureOut">
               <a:rPr lang="en-US" smtClean="0"/>
-              <a:t>12/16/2022</a:t>
+              <a:t>2/21/2023</a:t>
             </a:fld>
             <a:endParaRPr lang="en-US"/>
           </a:p>
@@ -668,7 +673,7 @@
           <a:p>
             <a:fld id="{376E7E80-D09A-4A29-92F7-BFBF497E4A0B}" type="datetimeFigureOut">
               <a:rPr lang="en-US" smtClean="0"/>
-              <a:t>12/16/2022</a:t>
+              <a:t>2/21/2023</a:t>
             </a:fld>
             <a:endParaRPr lang="en-US"/>
           </a:p>
@@ -866,7 +871,7 @@
           <a:p>
             <a:fld id="{376E7E80-D09A-4A29-92F7-BFBF497E4A0B}" type="datetimeFigureOut">
               <a:rPr lang="en-US" smtClean="0"/>
-              <a:t>12/16/2022</a:t>
+              <a:t>2/21/2023</a:t>
             </a:fld>
             <a:endParaRPr lang="en-US"/>
           </a:p>
@@ -1141,7 +1146,7 @@
           <a:p>
             <a:fld id="{376E7E80-D09A-4A29-92F7-BFBF497E4A0B}" type="datetimeFigureOut">
               <a:rPr lang="en-US" smtClean="0"/>
-              <a:t>12/16/2022</a:t>
+              <a:t>2/21/2023</a:t>
             </a:fld>
             <a:endParaRPr lang="en-US"/>
           </a:p>
@@ -1406,7 +1411,7 @@
           <a:p>
             <a:fld id="{376E7E80-D09A-4A29-92F7-BFBF497E4A0B}" type="datetimeFigureOut">
               <a:rPr lang="en-US" smtClean="0"/>
-              <a:t>12/16/2022</a:t>
+              <a:t>2/21/2023</a:t>
             </a:fld>
             <a:endParaRPr lang="en-US"/>
           </a:p>
@@ -1818,7 +1823,7 @@
           <a:p>
             <a:fld id="{376E7E80-D09A-4A29-92F7-BFBF497E4A0B}" type="datetimeFigureOut">
               <a:rPr lang="en-US" smtClean="0"/>
-              <a:t>12/16/2022</a:t>
+              <a:t>2/21/2023</a:t>
             </a:fld>
             <a:endParaRPr lang="en-US"/>
           </a:p>
@@ -1959,7 +1964,7 @@
           <a:p>
             <a:fld id="{376E7E80-D09A-4A29-92F7-BFBF497E4A0B}" type="datetimeFigureOut">
               <a:rPr lang="en-US" smtClean="0"/>
-              <a:t>12/16/2022</a:t>
+              <a:t>2/21/2023</a:t>
             </a:fld>
             <a:endParaRPr lang="en-US"/>
           </a:p>
@@ -2072,7 +2077,7 @@
           <a:p>
             <a:fld id="{376E7E80-D09A-4A29-92F7-BFBF497E4A0B}" type="datetimeFigureOut">
               <a:rPr lang="en-US" smtClean="0"/>
-              <a:t>12/16/2022</a:t>
+              <a:t>2/21/2023</a:t>
             </a:fld>
             <a:endParaRPr lang="en-US"/>
           </a:p>
@@ -2383,7 +2388,7 @@
           <a:p>
             <a:fld id="{376E7E80-D09A-4A29-92F7-BFBF497E4A0B}" type="datetimeFigureOut">
               <a:rPr lang="en-US" smtClean="0"/>
-              <a:t>12/16/2022</a:t>
+              <a:t>2/21/2023</a:t>
             </a:fld>
             <a:endParaRPr lang="en-US"/>
           </a:p>
@@ -2671,7 +2676,7 @@
           <a:p>
             <a:fld id="{376E7E80-D09A-4A29-92F7-BFBF497E4A0B}" type="datetimeFigureOut">
               <a:rPr lang="en-US" smtClean="0"/>
-              <a:t>12/16/2022</a:t>
+              <a:t>2/21/2023</a:t>
             </a:fld>
             <a:endParaRPr lang="en-US"/>
           </a:p>
@@ -2912,7 +2917,7 @@
           <a:p>
             <a:fld id="{376E7E80-D09A-4A29-92F7-BFBF497E4A0B}" type="datetimeFigureOut">
               <a:rPr lang="en-US" smtClean="0"/>
-              <a:t>12/16/2022</a:t>
+              <a:t>2/21/2023</a:t>
             </a:fld>
             <a:endParaRPr lang="en-US"/>
           </a:p>
@@ -6403,6 +6408,3674 @@
 </p:sld>
 </file>
 
+<file path=ppt/slides/slide5.xml><?xml version="1.0" encoding="utf-8"?>
+<p:sld xmlns:a="http://schemas.openxmlformats.org/drawingml/2006/main" xmlns:r="http://schemas.openxmlformats.org/officeDocument/2006/relationships" xmlns:p="http://schemas.openxmlformats.org/presentationml/2006/main">
+  <p:cSld>
+    <p:spTree>
+      <p:nvGrpSpPr>
+        <p:cNvPr id="1" name=""/>
+        <p:cNvGrpSpPr/>
+        <p:nvPr/>
+      </p:nvGrpSpPr>
+      <p:grpSpPr>
+        <a:xfrm>
+          <a:off x="0" y="0"/>
+          <a:ext cx="0" cy="0"/>
+          <a:chOff x="0" y="0"/>
+          <a:chExt cx="0" cy="0"/>
+        </a:xfrm>
+      </p:grpSpPr>
+      <p:sp>
+        <p:nvSpPr>
+          <p:cNvPr id="2" name="Title 1">
+            <a:extLst>
+              <a:ext uri="{FF2B5EF4-FFF2-40B4-BE49-F238E27FC236}">
+                <a16:creationId xmlns:a16="http://schemas.microsoft.com/office/drawing/2014/main" id="{00565350-04B5-7F60-1B0D-9847DE1BBD8E}"/>
+              </a:ext>
+            </a:extLst>
+          </p:cNvPr>
+          <p:cNvSpPr>
+            <a:spLocks noGrp="1"/>
+          </p:cNvSpPr>
+          <p:nvPr>
+            <p:ph type="title"/>
+          </p:nvPr>
+        </p:nvSpPr>
+        <p:spPr/>
+        <p:txBody>
+          <a:bodyPr/>
+          <a:lstStyle/>
+          <a:p>
+            <a:r>
+              <a:rPr lang="en-US" dirty="0"/>
+              <a:t>User Interfaces</a:t>
+            </a:r>
+          </a:p>
+        </p:txBody>
+      </p:sp>
+      <p:sp>
+        <p:nvSpPr>
+          <p:cNvPr id="3" name="Text Placeholder 2">
+            <a:extLst>
+              <a:ext uri="{FF2B5EF4-FFF2-40B4-BE49-F238E27FC236}">
+                <a16:creationId xmlns:a16="http://schemas.microsoft.com/office/drawing/2014/main" id="{8E0327C0-120B-A640-BC8B-49330F88792A}"/>
+              </a:ext>
+            </a:extLst>
+          </p:cNvPr>
+          <p:cNvSpPr>
+            <a:spLocks noGrp="1"/>
+          </p:cNvSpPr>
+          <p:nvPr>
+            <p:ph type="body" idx="1"/>
+          </p:nvPr>
+        </p:nvSpPr>
+        <p:spPr/>
+        <p:txBody>
+          <a:bodyPr/>
+          <a:lstStyle/>
+          <a:p>
+            <a:endParaRPr lang="en-US"/>
+          </a:p>
+        </p:txBody>
+      </p:sp>
+    </p:spTree>
+    <p:extLst>
+      <p:ext uri="{BB962C8B-B14F-4D97-AF65-F5344CB8AC3E}">
+        <p14:creationId xmlns:p14="http://schemas.microsoft.com/office/powerpoint/2010/main" val="2763991980"/>
+      </p:ext>
+    </p:extLst>
+  </p:cSld>
+  <p:clrMapOvr>
+    <a:masterClrMapping/>
+  </p:clrMapOvr>
+</p:sld>
+</file>
+
+<file path=ppt/slides/slide6.xml><?xml version="1.0" encoding="utf-8"?>
+<p:sld xmlns:a="http://schemas.openxmlformats.org/drawingml/2006/main" xmlns:r="http://schemas.openxmlformats.org/officeDocument/2006/relationships" xmlns:p="http://schemas.openxmlformats.org/presentationml/2006/main">
+  <p:cSld>
+    <p:spTree>
+      <p:nvGrpSpPr>
+        <p:cNvPr id="1" name=""/>
+        <p:cNvGrpSpPr/>
+        <p:nvPr/>
+      </p:nvGrpSpPr>
+      <p:grpSpPr>
+        <a:xfrm>
+          <a:off x="0" y="0"/>
+          <a:ext cx="0" cy="0"/>
+          <a:chOff x="0" y="0"/>
+          <a:chExt cx="0" cy="0"/>
+        </a:xfrm>
+      </p:grpSpPr>
+      <p:sp>
+        <p:nvSpPr>
+          <p:cNvPr id="2" name="Title 1">
+            <a:extLst>
+              <a:ext uri="{FF2B5EF4-FFF2-40B4-BE49-F238E27FC236}">
+                <a16:creationId xmlns:a16="http://schemas.microsoft.com/office/drawing/2014/main" id="{1C503A69-78AB-7248-7DA5-8239B7B1962D}"/>
+              </a:ext>
+            </a:extLst>
+          </p:cNvPr>
+          <p:cNvSpPr>
+            <a:spLocks noGrp="1"/>
+          </p:cNvSpPr>
+          <p:nvPr>
+            <p:ph type="title"/>
+          </p:nvPr>
+        </p:nvSpPr>
+        <p:spPr/>
+        <p:txBody>
+          <a:bodyPr/>
+          <a:lstStyle/>
+          <a:p>
+            <a:r>
+              <a:rPr lang="en-US" dirty="0"/>
+              <a:t>System Configuration</a:t>
+            </a:r>
+          </a:p>
+        </p:txBody>
+      </p:sp>
+      <p:sp>
+        <p:nvSpPr>
+          <p:cNvPr id="4" name="Rectangle 3">
+            <a:extLst>
+              <a:ext uri="{FF2B5EF4-FFF2-40B4-BE49-F238E27FC236}">
+                <a16:creationId xmlns:a16="http://schemas.microsoft.com/office/drawing/2014/main" id="{DBC2A214-A3AB-344B-01B9-C286E33D684D}"/>
+              </a:ext>
+            </a:extLst>
+          </p:cNvPr>
+          <p:cNvSpPr/>
+          <p:nvPr/>
+        </p:nvSpPr>
+        <p:spPr>
+          <a:xfrm>
+            <a:off x="1695634" y="1793289"/>
+            <a:ext cx="8673483" cy="3160451"/>
+          </a:xfrm>
+          <a:prstGeom prst="rect">
+            <a:avLst/>
+          </a:prstGeom>
+          <a:noFill/>
+          <a:ln w="76200"/>
+        </p:spPr>
+        <p:style>
+          <a:lnRef idx="2">
+            <a:schemeClr val="accent5"/>
+          </a:lnRef>
+          <a:fillRef idx="1">
+            <a:schemeClr val="lt1"/>
+          </a:fillRef>
+          <a:effectRef idx="0">
+            <a:schemeClr val="accent5"/>
+          </a:effectRef>
+          <a:fontRef idx="minor">
+            <a:schemeClr val="dk1"/>
+          </a:fontRef>
+        </p:style>
+        <p:txBody>
+          <a:bodyPr rtlCol="0" anchor="ctr"/>
+          <a:lstStyle/>
+          <a:p>
+            <a:pPr algn="ctr"/>
+            <a:endParaRPr lang="en-US"/>
+          </a:p>
+        </p:txBody>
+      </p:sp>
+      <p:sp>
+        <p:nvSpPr>
+          <p:cNvPr id="5" name="Rectangle 4">
+            <a:extLst>
+              <a:ext uri="{FF2B5EF4-FFF2-40B4-BE49-F238E27FC236}">
+                <a16:creationId xmlns:a16="http://schemas.microsoft.com/office/drawing/2014/main" id="{2BFEDD03-EC7A-7279-F292-D53ED93A8B93}"/>
+              </a:ext>
+            </a:extLst>
+          </p:cNvPr>
+          <p:cNvSpPr/>
+          <p:nvPr/>
+        </p:nvSpPr>
+        <p:spPr>
+          <a:xfrm>
+            <a:off x="2007832" y="2354062"/>
+            <a:ext cx="2670700" cy="389138"/>
+          </a:xfrm>
+          <a:prstGeom prst="rect">
+            <a:avLst/>
+          </a:prstGeom>
+          <a:noFill/>
+          <a:ln w="38100"/>
+        </p:spPr>
+        <p:style>
+          <a:lnRef idx="2">
+            <a:schemeClr val="accent5"/>
+          </a:lnRef>
+          <a:fillRef idx="1">
+            <a:schemeClr val="lt1"/>
+          </a:fillRef>
+          <a:effectRef idx="0">
+            <a:schemeClr val="accent5"/>
+          </a:effectRef>
+          <a:fontRef idx="minor">
+            <a:schemeClr val="dk1"/>
+          </a:fontRef>
+        </p:style>
+        <p:txBody>
+          <a:bodyPr rtlCol="0" anchor="ctr"/>
+          <a:lstStyle/>
+          <a:p>
+            <a:pPr algn="ctr"/>
+            <a:endParaRPr lang="en-US"/>
+          </a:p>
+        </p:txBody>
+      </p:sp>
+      <p:sp>
+        <p:nvSpPr>
+          <p:cNvPr id="6" name="TextBox 5">
+            <a:extLst>
+              <a:ext uri="{FF2B5EF4-FFF2-40B4-BE49-F238E27FC236}">
+                <a16:creationId xmlns:a16="http://schemas.microsoft.com/office/drawing/2014/main" id="{E9A1D550-DC6B-6769-3F60-4210568830F0}"/>
+              </a:ext>
+            </a:extLst>
+          </p:cNvPr>
+          <p:cNvSpPr txBox="1"/>
+          <p:nvPr/>
+        </p:nvSpPr>
+        <p:spPr>
+          <a:xfrm>
+            <a:off x="1892421" y="1984730"/>
+            <a:ext cx="2049263" cy="369332"/>
+          </a:xfrm>
+          <a:prstGeom prst="rect">
+            <a:avLst/>
+          </a:prstGeom>
+          <a:noFill/>
+        </p:spPr>
+        <p:txBody>
+          <a:bodyPr wrap="square" rtlCol="0">
+            <a:spAutoFit/>
+          </a:bodyPr>
+          <a:lstStyle/>
+          <a:p>
+            <a:r>
+              <a:rPr lang="en-US" dirty="0"/>
+              <a:t>Organization Name</a:t>
+            </a:r>
+          </a:p>
+        </p:txBody>
+      </p:sp>
+      <p:sp>
+        <p:nvSpPr>
+          <p:cNvPr id="7" name="Rectangle 6">
+            <a:extLst>
+              <a:ext uri="{FF2B5EF4-FFF2-40B4-BE49-F238E27FC236}">
+                <a16:creationId xmlns:a16="http://schemas.microsoft.com/office/drawing/2014/main" id="{AD969949-F4DE-9019-7930-78D58105C1E9}"/>
+              </a:ext>
+            </a:extLst>
+          </p:cNvPr>
+          <p:cNvSpPr/>
+          <p:nvPr/>
+        </p:nvSpPr>
+        <p:spPr>
+          <a:xfrm>
+            <a:off x="2007832" y="3215133"/>
+            <a:ext cx="2670700" cy="389138"/>
+          </a:xfrm>
+          <a:prstGeom prst="rect">
+            <a:avLst/>
+          </a:prstGeom>
+          <a:noFill/>
+          <a:ln w="38100"/>
+        </p:spPr>
+        <p:style>
+          <a:lnRef idx="2">
+            <a:schemeClr val="accent5"/>
+          </a:lnRef>
+          <a:fillRef idx="1">
+            <a:schemeClr val="lt1"/>
+          </a:fillRef>
+          <a:effectRef idx="0">
+            <a:schemeClr val="accent5"/>
+          </a:effectRef>
+          <a:fontRef idx="minor">
+            <a:schemeClr val="dk1"/>
+          </a:fontRef>
+        </p:style>
+        <p:txBody>
+          <a:bodyPr rtlCol="0" anchor="ctr"/>
+          <a:lstStyle/>
+          <a:p>
+            <a:pPr algn="ctr"/>
+            <a:endParaRPr lang="en-US"/>
+          </a:p>
+        </p:txBody>
+      </p:sp>
+      <p:sp>
+        <p:nvSpPr>
+          <p:cNvPr id="8" name="TextBox 7">
+            <a:extLst>
+              <a:ext uri="{FF2B5EF4-FFF2-40B4-BE49-F238E27FC236}">
+                <a16:creationId xmlns:a16="http://schemas.microsoft.com/office/drawing/2014/main" id="{0539E2DC-5B15-5F89-B3AB-89E624C15C63}"/>
+              </a:ext>
+            </a:extLst>
+          </p:cNvPr>
+          <p:cNvSpPr txBox="1"/>
+          <p:nvPr/>
+        </p:nvSpPr>
+        <p:spPr>
+          <a:xfrm>
+            <a:off x="1892421" y="2845801"/>
+            <a:ext cx="2049263" cy="369332"/>
+          </a:xfrm>
+          <a:prstGeom prst="rect">
+            <a:avLst/>
+          </a:prstGeom>
+          <a:noFill/>
+        </p:spPr>
+        <p:txBody>
+          <a:bodyPr wrap="square" rtlCol="0">
+            <a:spAutoFit/>
+          </a:bodyPr>
+          <a:lstStyle/>
+          <a:p>
+            <a:r>
+              <a:rPr lang="en-US" dirty="0"/>
+              <a:t>CCN</a:t>
+            </a:r>
+          </a:p>
+        </p:txBody>
+      </p:sp>
+      <p:sp>
+        <p:nvSpPr>
+          <p:cNvPr id="9" name="Rectangle 8">
+            <a:extLst>
+              <a:ext uri="{FF2B5EF4-FFF2-40B4-BE49-F238E27FC236}">
+                <a16:creationId xmlns:a16="http://schemas.microsoft.com/office/drawing/2014/main" id="{16190BCC-C2B8-C018-33B4-419F903A78B6}"/>
+              </a:ext>
+            </a:extLst>
+          </p:cNvPr>
+          <p:cNvSpPr/>
+          <p:nvPr/>
+        </p:nvSpPr>
+        <p:spPr>
+          <a:xfrm>
+            <a:off x="2007832" y="4103968"/>
+            <a:ext cx="2670700" cy="389138"/>
+          </a:xfrm>
+          <a:prstGeom prst="rect">
+            <a:avLst/>
+          </a:prstGeom>
+          <a:noFill/>
+          <a:ln w="38100"/>
+        </p:spPr>
+        <p:style>
+          <a:lnRef idx="2">
+            <a:schemeClr val="accent5"/>
+          </a:lnRef>
+          <a:fillRef idx="1">
+            <a:schemeClr val="lt1"/>
+          </a:fillRef>
+          <a:effectRef idx="0">
+            <a:schemeClr val="accent5"/>
+          </a:effectRef>
+          <a:fontRef idx="minor">
+            <a:schemeClr val="dk1"/>
+          </a:fontRef>
+        </p:style>
+        <p:txBody>
+          <a:bodyPr rtlCol="0" anchor="ctr"/>
+          <a:lstStyle/>
+          <a:p>
+            <a:pPr algn="ctr"/>
+            <a:endParaRPr lang="en-US"/>
+          </a:p>
+        </p:txBody>
+      </p:sp>
+      <p:sp>
+        <p:nvSpPr>
+          <p:cNvPr id="10" name="TextBox 9">
+            <a:extLst>
+              <a:ext uri="{FF2B5EF4-FFF2-40B4-BE49-F238E27FC236}">
+                <a16:creationId xmlns:a16="http://schemas.microsoft.com/office/drawing/2014/main" id="{4D4907F0-6E26-AF20-0E4A-D008C59BBE04}"/>
+              </a:ext>
+            </a:extLst>
+          </p:cNvPr>
+          <p:cNvSpPr txBox="1"/>
+          <p:nvPr/>
+        </p:nvSpPr>
+        <p:spPr>
+          <a:xfrm>
+            <a:off x="1892421" y="3734636"/>
+            <a:ext cx="2670700" cy="369332"/>
+          </a:xfrm>
+          <a:prstGeom prst="rect">
+            <a:avLst/>
+          </a:prstGeom>
+          <a:noFill/>
+        </p:spPr>
+        <p:txBody>
+          <a:bodyPr wrap="square" rtlCol="0">
+            <a:spAutoFit/>
+          </a:bodyPr>
+          <a:lstStyle/>
+          <a:p>
+            <a:r>
+              <a:rPr lang="en-US" dirty="0"/>
+              <a:t>Receiving System Endpoint</a:t>
+            </a:r>
+          </a:p>
+        </p:txBody>
+      </p:sp>
+      <p:sp>
+        <p:nvSpPr>
+          <p:cNvPr id="11" name="Rectangle 10">
+            <a:extLst>
+              <a:ext uri="{FF2B5EF4-FFF2-40B4-BE49-F238E27FC236}">
+                <a16:creationId xmlns:a16="http://schemas.microsoft.com/office/drawing/2014/main" id="{EDD2FE86-F5D5-C672-5B3E-521B99591CB0}"/>
+              </a:ext>
+            </a:extLst>
+          </p:cNvPr>
+          <p:cNvSpPr/>
+          <p:nvPr/>
+        </p:nvSpPr>
+        <p:spPr>
+          <a:xfrm>
+            <a:off x="5231905" y="2354062"/>
+            <a:ext cx="4329345" cy="2139044"/>
+          </a:xfrm>
+          <a:prstGeom prst="rect">
+            <a:avLst/>
+          </a:prstGeom>
+          <a:noFill/>
+          <a:ln w="38100"/>
+        </p:spPr>
+        <p:style>
+          <a:lnRef idx="2">
+            <a:schemeClr val="accent5"/>
+          </a:lnRef>
+          <a:fillRef idx="1">
+            <a:schemeClr val="lt1"/>
+          </a:fillRef>
+          <a:effectRef idx="0">
+            <a:schemeClr val="accent5"/>
+          </a:effectRef>
+          <a:fontRef idx="minor">
+            <a:schemeClr val="dk1"/>
+          </a:fontRef>
+        </p:style>
+        <p:txBody>
+          <a:bodyPr rtlCol="0" anchor="ctr"/>
+          <a:lstStyle/>
+          <a:p>
+            <a:pPr algn="ctr"/>
+            <a:endParaRPr lang="en-US"/>
+          </a:p>
+        </p:txBody>
+      </p:sp>
+      <p:sp>
+        <p:nvSpPr>
+          <p:cNvPr id="12" name="TextBox 11">
+            <a:extLst>
+              <a:ext uri="{FF2B5EF4-FFF2-40B4-BE49-F238E27FC236}">
+                <a16:creationId xmlns:a16="http://schemas.microsoft.com/office/drawing/2014/main" id="{C92F78AE-4A9F-C51E-26F1-F30A51905B11}"/>
+              </a:ext>
+            </a:extLst>
+          </p:cNvPr>
+          <p:cNvSpPr txBox="1"/>
+          <p:nvPr/>
+        </p:nvSpPr>
+        <p:spPr>
+          <a:xfrm>
+            <a:off x="5116495" y="1984730"/>
+            <a:ext cx="2049263" cy="369332"/>
+          </a:xfrm>
+          <a:prstGeom prst="rect">
+            <a:avLst/>
+          </a:prstGeom>
+          <a:noFill/>
+        </p:spPr>
+        <p:txBody>
+          <a:bodyPr wrap="square" rtlCol="0">
+            <a:spAutoFit/>
+          </a:bodyPr>
+          <a:lstStyle/>
+          <a:p>
+            <a:r>
+              <a:rPr lang="en-US" dirty="0"/>
+              <a:t>Facilities</a:t>
+            </a:r>
+          </a:p>
+        </p:txBody>
+      </p:sp>
+      <p:sp>
+        <p:nvSpPr>
+          <p:cNvPr id="13" name="Rectangle 12">
+            <a:extLst>
+              <a:ext uri="{FF2B5EF4-FFF2-40B4-BE49-F238E27FC236}">
+                <a16:creationId xmlns:a16="http://schemas.microsoft.com/office/drawing/2014/main" id="{F5E71E59-EC73-7B0E-70B9-96262E0F0445}"/>
+              </a:ext>
+            </a:extLst>
+          </p:cNvPr>
+          <p:cNvSpPr/>
+          <p:nvPr/>
+        </p:nvSpPr>
+        <p:spPr>
+          <a:xfrm>
+            <a:off x="9676660" y="2385705"/>
+            <a:ext cx="377303" cy="369332"/>
+          </a:xfrm>
+          <a:prstGeom prst="rect">
+            <a:avLst/>
+          </a:prstGeom>
+          <a:noFill/>
+          <a:ln w="38100"/>
+        </p:spPr>
+        <p:style>
+          <a:lnRef idx="2">
+            <a:schemeClr val="accent5"/>
+          </a:lnRef>
+          <a:fillRef idx="1">
+            <a:schemeClr val="lt1"/>
+          </a:fillRef>
+          <a:effectRef idx="0">
+            <a:schemeClr val="accent5"/>
+          </a:effectRef>
+          <a:fontRef idx="minor">
+            <a:schemeClr val="dk1"/>
+          </a:fontRef>
+        </p:style>
+        <p:txBody>
+          <a:bodyPr rtlCol="0" anchor="ctr"/>
+          <a:lstStyle/>
+          <a:p>
+            <a:pPr algn="ctr"/>
+            <a:endParaRPr lang="en-US"/>
+          </a:p>
+        </p:txBody>
+      </p:sp>
+      <p:sp>
+        <p:nvSpPr>
+          <p:cNvPr id="14" name="Cross 13">
+            <a:extLst>
+              <a:ext uri="{FF2B5EF4-FFF2-40B4-BE49-F238E27FC236}">
+                <a16:creationId xmlns:a16="http://schemas.microsoft.com/office/drawing/2014/main" id="{71364A29-8C53-38C2-9FA3-F72DEBB2896D}"/>
+              </a:ext>
+            </a:extLst>
+          </p:cNvPr>
+          <p:cNvSpPr/>
+          <p:nvPr/>
+        </p:nvSpPr>
+        <p:spPr>
+          <a:xfrm>
+            <a:off x="9744353" y="2446453"/>
+            <a:ext cx="241916" cy="247836"/>
+          </a:xfrm>
+          <a:prstGeom prst="plus">
+            <a:avLst>
+              <a:gd name="adj" fmla="val 46727"/>
+            </a:avLst>
+          </a:prstGeom>
+        </p:spPr>
+        <p:style>
+          <a:lnRef idx="2">
+            <a:schemeClr val="accent1">
+              <a:shade val="50000"/>
+            </a:schemeClr>
+          </a:lnRef>
+          <a:fillRef idx="1">
+            <a:schemeClr val="accent1"/>
+          </a:fillRef>
+          <a:effectRef idx="0">
+            <a:schemeClr val="accent1"/>
+          </a:effectRef>
+          <a:fontRef idx="minor">
+            <a:schemeClr val="lt1"/>
+          </a:fontRef>
+        </p:style>
+        <p:txBody>
+          <a:bodyPr rtlCol="0" anchor="ctr"/>
+          <a:lstStyle/>
+          <a:p>
+            <a:pPr algn="ctr"/>
+            <a:endParaRPr lang="en-US"/>
+          </a:p>
+        </p:txBody>
+      </p:sp>
+      <p:sp>
+        <p:nvSpPr>
+          <p:cNvPr id="15" name="Rectangle 14">
+            <a:extLst>
+              <a:ext uri="{FF2B5EF4-FFF2-40B4-BE49-F238E27FC236}">
+                <a16:creationId xmlns:a16="http://schemas.microsoft.com/office/drawing/2014/main" id="{1BB62AA1-F9DA-A1FB-5FED-AA15848BDC28}"/>
+              </a:ext>
+            </a:extLst>
+          </p:cNvPr>
+          <p:cNvSpPr/>
+          <p:nvPr/>
+        </p:nvSpPr>
+        <p:spPr>
+          <a:xfrm>
+            <a:off x="9676659" y="2844162"/>
+            <a:ext cx="377303" cy="369332"/>
+          </a:xfrm>
+          <a:prstGeom prst="rect">
+            <a:avLst/>
+          </a:prstGeom>
+          <a:noFill/>
+          <a:ln w="38100"/>
+        </p:spPr>
+        <p:style>
+          <a:lnRef idx="2">
+            <a:schemeClr val="accent5"/>
+          </a:lnRef>
+          <a:fillRef idx="1">
+            <a:schemeClr val="lt1"/>
+          </a:fillRef>
+          <a:effectRef idx="0">
+            <a:schemeClr val="accent5"/>
+          </a:effectRef>
+          <a:fontRef idx="minor">
+            <a:schemeClr val="dk1"/>
+          </a:fontRef>
+        </p:style>
+        <p:txBody>
+          <a:bodyPr rtlCol="0" anchor="ctr"/>
+          <a:lstStyle/>
+          <a:p>
+            <a:pPr algn="ctr"/>
+            <a:endParaRPr lang="en-US"/>
+          </a:p>
+        </p:txBody>
+      </p:sp>
+      <p:pic>
+        <p:nvPicPr>
+          <p:cNvPr id="17" name="Picture 16">
+            <a:extLst>
+              <a:ext uri="{FF2B5EF4-FFF2-40B4-BE49-F238E27FC236}">
+                <a16:creationId xmlns:a16="http://schemas.microsoft.com/office/drawing/2014/main" id="{0D91CF9B-76A5-4751-DB99-38D784BEA6D5}"/>
+              </a:ext>
+            </a:extLst>
+          </p:cNvPr>
+          <p:cNvPicPr>
+            <a:picLocks noChangeAspect="1"/>
+          </p:cNvPicPr>
+          <p:nvPr/>
+        </p:nvPicPr>
+        <p:blipFill>
+          <a:blip r:embed="rId2">
+            <a:extLst>
+              <a:ext uri="{28A0092B-C50C-407E-A947-70E740481C1C}">
+                <a14:useLocalDpi xmlns:a14="http://schemas.microsoft.com/office/drawing/2010/main" val="0"/>
+              </a:ext>
+            </a:extLst>
+          </a:blip>
+          <a:stretch>
+            <a:fillRect/>
+          </a:stretch>
+        </p:blipFill>
+        <p:spPr>
+          <a:xfrm>
+            <a:off x="9744353" y="2898395"/>
+            <a:ext cx="260866" cy="260866"/>
+          </a:xfrm>
+          <a:prstGeom prst="rect">
+            <a:avLst/>
+          </a:prstGeom>
+        </p:spPr>
+      </p:pic>
+      <p:sp>
+        <p:nvSpPr>
+          <p:cNvPr id="18" name="Rectangle 17">
+            <a:extLst>
+              <a:ext uri="{FF2B5EF4-FFF2-40B4-BE49-F238E27FC236}">
+                <a16:creationId xmlns:a16="http://schemas.microsoft.com/office/drawing/2014/main" id="{A29C07AE-1A48-2EEC-6135-3A49761E4083}"/>
+              </a:ext>
+            </a:extLst>
+          </p:cNvPr>
+          <p:cNvSpPr/>
+          <p:nvPr/>
+        </p:nvSpPr>
+        <p:spPr>
+          <a:xfrm>
+            <a:off x="9676658" y="3307789"/>
+            <a:ext cx="377303" cy="369332"/>
+          </a:xfrm>
+          <a:prstGeom prst="rect">
+            <a:avLst/>
+          </a:prstGeom>
+          <a:noFill/>
+          <a:ln w="38100"/>
+        </p:spPr>
+        <p:style>
+          <a:lnRef idx="2">
+            <a:schemeClr val="accent5"/>
+          </a:lnRef>
+          <a:fillRef idx="1">
+            <a:schemeClr val="lt1"/>
+          </a:fillRef>
+          <a:effectRef idx="0">
+            <a:schemeClr val="accent5"/>
+          </a:effectRef>
+          <a:fontRef idx="minor">
+            <a:schemeClr val="dk1"/>
+          </a:fontRef>
+        </p:style>
+        <p:txBody>
+          <a:bodyPr rtlCol="0" anchor="ctr"/>
+          <a:lstStyle/>
+          <a:p>
+            <a:pPr algn="ctr"/>
+            <a:endParaRPr lang="en-US"/>
+          </a:p>
+        </p:txBody>
+      </p:sp>
+      <p:sp>
+        <p:nvSpPr>
+          <p:cNvPr id="19" name="Rectangle 18">
+            <a:extLst>
+              <a:ext uri="{FF2B5EF4-FFF2-40B4-BE49-F238E27FC236}">
+                <a16:creationId xmlns:a16="http://schemas.microsoft.com/office/drawing/2014/main" id="{32EF234A-A4BC-B64E-0C29-52AFDCFA31BA}"/>
+              </a:ext>
+            </a:extLst>
+          </p:cNvPr>
+          <p:cNvSpPr/>
+          <p:nvPr/>
+        </p:nvSpPr>
+        <p:spPr>
+          <a:xfrm>
+            <a:off x="9749496" y="3469001"/>
+            <a:ext cx="218085" cy="46490"/>
+          </a:xfrm>
+          <a:prstGeom prst="rect">
+            <a:avLst/>
+          </a:prstGeom>
+          <a:noFill/>
+          <a:ln w="38100"/>
+        </p:spPr>
+        <p:style>
+          <a:lnRef idx="2">
+            <a:schemeClr val="accent5"/>
+          </a:lnRef>
+          <a:fillRef idx="1">
+            <a:schemeClr val="lt1"/>
+          </a:fillRef>
+          <a:effectRef idx="0">
+            <a:schemeClr val="accent5"/>
+          </a:effectRef>
+          <a:fontRef idx="minor">
+            <a:schemeClr val="dk1"/>
+          </a:fontRef>
+        </p:style>
+        <p:txBody>
+          <a:bodyPr rtlCol="0" anchor="ctr"/>
+          <a:lstStyle/>
+          <a:p>
+            <a:pPr algn="ctr"/>
+            <a:endParaRPr lang="en-US"/>
+          </a:p>
+        </p:txBody>
+      </p:sp>
+      <p:sp>
+        <p:nvSpPr>
+          <p:cNvPr id="20" name="TextBox 19">
+            <a:extLst>
+              <a:ext uri="{FF2B5EF4-FFF2-40B4-BE49-F238E27FC236}">
+                <a16:creationId xmlns:a16="http://schemas.microsoft.com/office/drawing/2014/main" id="{EBA7770C-4CEC-D9EF-982D-0DD5C3FB1F85}"/>
+              </a:ext>
+            </a:extLst>
+          </p:cNvPr>
+          <p:cNvSpPr txBox="1"/>
+          <p:nvPr/>
+        </p:nvSpPr>
+        <p:spPr>
+          <a:xfrm>
+            <a:off x="2116344" y="2394742"/>
+            <a:ext cx="2222853" cy="307777"/>
+          </a:xfrm>
+          <a:prstGeom prst="rect">
+            <a:avLst/>
+          </a:prstGeom>
+          <a:noFill/>
+        </p:spPr>
+        <p:txBody>
+          <a:bodyPr wrap="none" rtlCol="0">
+            <a:spAutoFit/>
+          </a:bodyPr>
+          <a:lstStyle/>
+          <a:p>
+            <a:r>
+              <a:rPr lang="en-US" sz="1400" i="1" dirty="0"/>
+              <a:t>Acme Provider Organization</a:t>
+            </a:r>
+          </a:p>
+        </p:txBody>
+      </p:sp>
+      <p:sp>
+        <p:nvSpPr>
+          <p:cNvPr id="21" name="TextBox 20">
+            <a:extLst>
+              <a:ext uri="{FF2B5EF4-FFF2-40B4-BE49-F238E27FC236}">
+                <a16:creationId xmlns:a16="http://schemas.microsoft.com/office/drawing/2014/main" id="{3FAACD7E-FA38-8FED-BEC9-D32D3516CEC9}"/>
+              </a:ext>
+            </a:extLst>
+          </p:cNvPr>
+          <p:cNvSpPr txBox="1"/>
+          <p:nvPr/>
+        </p:nvSpPr>
+        <p:spPr>
+          <a:xfrm>
+            <a:off x="2116343" y="3255813"/>
+            <a:ext cx="641522" cy="307777"/>
+          </a:xfrm>
+          <a:prstGeom prst="rect">
+            <a:avLst/>
+          </a:prstGeom>
+          <a:noFill/>
+        </p:spPr>
+        <p:txBody>
+          <a:bodyPr wrap="none" rtlCol="0">
+            <a:spAutoFit/>
+          </a:bodyPr>
+          <a:lstStyle/>
+          <a:p>
+            <a:r>
+              <a:rPr lang="en-US" sz="1400" i="1" dirty="0"/>
+              <a:t>12345</a:t>
+            </a:r>
+          </a:p>
+        </p:txBody>
+      </p:sp>
+      <p:sp>
+        <p:nvSpPr>
+          <p:cNvPr id="22" name="TextBox 21">
+            <a:extLst>
+              <a:ext uri="{FF2B5EF4-FFF2-40B4-BE49-F238E27FC236}">
+                <a16:creationId xmlns:a16="http://schemas.microsoft.com/office/drawing/2014/main" id="{7121765A-9291-AFDA-7CE0-6FC38C88E897}"/>
+              </a:ext>
+            </a:extLst>
+          </p:cNvPr>
+          <p:cNvSpPr txBox="1"/>
+          <p:nvPr/>
+        </p:nvSpPr>
+        <p:spPr>
+          <a:xfrm>
+            <a:off x="2116343" y="4144648"/>
+            <a:ext cx="2446778" cy="307777"/>
+          </a:xfrm>
+          <a:prstGeom prst="rect">
+            <a:avLst/>
+          </a:prstGeom>
+          <a:noFill/>
+        </p:spPr>
+        <p:txBody>
+          <a:bodyPr wrap="square" rtlCol="0">
+            <a:spAutoFit/>
+          </a:bodyPr>
+          <a:lstStyle/>
+          <a:p>
+            <a:r>
+              <a:rPr lang="en-US" sz="1400" i="1" dirty="0"/>
+              <a:t>https://cms.gov/ecqms/fhir</a:t>
+            </a:r>
+          </a:p>
+        </p:txBody>
+      </p:sp>
+      <p:sp>
+        <p:nvSpPr>
+          <p:cNvPr id="23" name="TextBox 22">
+            <a:extLst>
+              <a:ext uri="{FF2B5EF4-FFF2-40B4-BE49-F238E27FC236}">
+                <a16:creationId xmlns:a16="http://schemas.microsoft.com/office/drawing/2014/main" id="{1F5FA7E6-A4FB-3B0B-008D-595836F06698}"/>
+              </a:ext>
+            </a:extLst>
+          </p:cNvPr>
+          <p:cNvSpPr txBox="1"/>
+          <p:nvPr/>
+        </p:nvSpPr>
+        <p:spPr>
+          <a:xfrm>
+            <a:off x="5310230" y="2415617"/>
+            <a:ext cx="3711056" cy="307777"/>
+          </a:xfrm>
+          <a:prstGeom prst="rect">
+            <a:avLst/>
+          </a:prstGeom>
+          <a:noFill/>
+        </p:spPr>
+        <p:txBody>
+          <a:bodyPr wrap="square" rtlCol="0">
+            <a:spAutoFit/>
+          </a:bodyPr>
+          <a:lstStyle/>
+          <a:p>
+            <a:r>
+              <a:rPr lang="en-US" sz="1400" i="1" dirty="0"/>
+              <a:t>Acme Location North</a:t>
+            </a:r>
+          </a:p>
+        </p:txBody>
+      </p:sp>
+      <p:cxnSp>
+        <p:nvCxnSpPr>
+          <p:cNvPr id="25" name="Straight Connector 24">
+            <a:extLst>
+              <a:ext uri="{FF2B5EF4-FFF2-40B4-BE49-F238E27FC236}">
+                <a16:creationId xmlns:a16="http://schemas.microsoft.com/office/drawing/2014/main" id="{0A4B87DB-F32C-8AFC-72F5-9752F535CDEC}"/>
+              </a:ext>
+            </a:extLst>
+          </p:cNvPr>
+          <p:cNvCxnSpPr/>
+          <p:nvPr/>
+        </p:nvCxnSpPr>
+        <p:spPr>
+          <a:xfrm>
+            <a:off x="5379868" y="2767222"/>
+            <a:ext cx="3986074" cy="0"/>
+          </a:xfrm>
+          <a:prstGeom prst="line">
+            <a:avLst/>
+          </a:prstGeom>
+          <a:ln w="38100"/>
+        </p:spPr>
+        <p:style>
+          <a:lnRef idx="1">
+            <a:schemeClr val="accent1"/>
+          </a:lnRef>
+          <a:fillRef idx="0">
+            <a:schemeClr val="accent1"/>
+          </a:fillRef>
+          <a:effectRef idx="0">
+            <a:schemeClr val="accent1"/>
+          </a:effectRef>
+          <a:fontRef idx="minor">
+            <a:schemeClr val="tx1"/>
+          </a:fontRef>
+        </p:style>
+      </p:cxnSp>
+      <p:sp>
+        <p:nvSpPr>
+          <p:cNvPr id="26" name="TextBox 25">
+            <a:extLst>
+              <a:ext uri="{FF2B5EF4-FFF2-40B4-BE49-F238E27FC236}">
+                <a16:creationId xmlns:a16="http://schemas.microsoft.com/office/drawing/2014/main" id="{DFD1D3F4-BCAB-FDC9-620B-466883B6E59A}"/>
+              </a:ext>
+            </a:extLst>
+          </p:cNvPr>
+          <p:cNvSpPr txBox="1"/>
+          <p:nvPr/>
+        </p:nvSpPr>
+        <p:spPr>
+          <a:xfrm>
+            <a:off x="5310230" y="2839143"/>
+            <a:ext cx="3711056" cy="307777"/>
+          </a:xfrm>
+          <a:prstGeom prst="rect">
+            <a:avLst/>
+          </a:prstGeom>
+          <a:noFill/>
+        </p:spPr>
+        <p:txBody>
+          <a:bodyPr wrap="square" rtlCol="0">
+            <a:spAutoFit/>
+          </a:bodyPr>
+          <a:lstStyle/>
+          <a:p>
+            <a:r>
+              <a:rPr lang="en-US" sz="1400" i="1" dirty="0"/>
+              <a:t>Acme Location South</a:t>
+            </a:r>
+          </a:p>
+        </p:txBody>
+      </p:sp>
+      <p:cxnSp>
+        <p:nvCxnSpPr>
+          <p:cNvPr id="27" name="Straight Connector 26">
+            <a:extLst>
+              <a:ext uri="{FF2B5EF4-FFF2-40B4-BE49-F238E27FC236}">
+                <a16:creationId xmlns:a16="http://schemas.microsoft.com/office/drawing/2014/main" id="{272157B8-8326-5601-C9ED-FC2776525A2A}"/>
+              </a:ext>
+            </a:extLst>
+          </p:cNvPr>
+          <p:cNvCxnSpPr/>
+          <p:nvPr/>
+        </p:nvCxnSpPr>
+        <p:spPr>
+          <a:xfrm>
+            <a:off x="5379868" y="3213494"/>
+            <a:ext cx="3986074" cy="0"/>
+          </a:xfrm>
+          <a:prstGeom prst="line">
+            <a:avLst/>
+          </a:prstGeom>
+          <a:ln w="38100"/>
+        </p:spPr>
+        <p:style>
+          <a:lnRef idx="1">
+            <a:schemeClr val="accent1"/>
+          </a:lnRef>
+          <a:fillRef idx="0">
+            <a:schemeClr val="accent1"/>
+          </a:fillRef>
+          <a:effectRef idx="0">
+            <a:schemeClr val="accent1"/>
+          </a:effectRef>
+          <a:fontRef idx="minor">
+            <a:schemeClr val="tx1"/>
+          </a:fontRef>
+        </p:style>
+      </p:cxnSp>
+    </p:spTree>
+    <p:extLst>
+      <p:ext uri="{BB962C8B-B14F-4D97-AF65-F5344CB8AC3E}">
+        <p14:creationId xmlns:p14="http://schemas.microsoft.com/office/powerpoint/2010/main" val="569172139"/>
+      </p:ext>
+    </p:extLst>
+  </p:cSld>
+  <p:clrMapOvr>
+    <a:masterClrMapping/>
+  </p:clrMapOvr>
+</p:sld>
+</file>
+
+<file path=ppt/slides/slide7.xml><?xml version="1.0" encoding="utf-8"?>
+<p:sld xmlns:a="http://schemas.openxmlformats.org/drawingml/2006/main" xmlns:r="http://schemas.openxmlformats.org/officeDocument/2006/relationships" xmlns:p="http://schemas.openxmlformats.org/presentationml/2006/main">
+  <p:cSld>
+    <p:spTree>
+      <p:nvGrpSpPr>
+        <p:cNvPr id="1" name=""/>
+        <p:cNvGrpSpPr/>
+        <p:nvPr/>
+      </p:nvGrpSpPr>
+      <p:grpSpPr>
+        <a:xfrm>
+          <a:off x="0" y="0"/>
+          <a:ext cx="0" cy="0"/>
+          <a:chOff x="0" y="0"/>
+          <a:chExt cx="0" cy="0"/>
+        </a:xfrm>
+      </p:grpSpPr>
+      <p:sp>
+        <p:nvSpPr>
+          <p:cNvPr id="2" name="Title 1">
+            <a:extLst>
+              <a:ext uri="{FF2B5EF4-FFF2-40B4-BE49-F238E27FC236}">
+                <a16:creationId xmlns:a16="http://schemas.microsoft.com/office/drawing/2014/main" id="{04ACB37C-3B96-C5BB-63D3-0177E8286019}"/>
+              </a:ext>
+            </a:extLst>
+          </p:cNvPr>
+          <p:cNvSpPr>
+            <a:spLocks noGrp="1"/>
+          </p:cNvSpPr>
+          <p:nvPr>
+            <p:ph type="title"/>
+          </p:nvPr>
+        </p:nvSpPr>
+        <p:spPr/>
+        <p:txBody>
+          <a:bodyPr/>
+          <a:lstStyle/>
+          <a:p>
+            <a:r>
+              <a:rPr lang="en-US" dirty="0"/>
+              <a:t>Site Management</a:t>
+            </a:r>
+          </a:p>
+        </p:txBody>
+      </p:sp>
+      <p:sp>
+        <p:nvSpPr>
+          <p:cNvPr id="4" name="Rectangle 3">
+            <a:extLst>
+              <a:ext uri="{FF2B5EF4-FFF2-40B4-BE49-F238E27FC236}">
+                <a16:creationId xmlns:a16="http://schemas.microsoft.com/office/drawing/2014/main" id="{B2F08085-A605-EB9C-6395-303F8D179321}"/>
+              </a:ext>
+            </a:extLst>
+          </p:cNvPr>
+          <p:cNvSpPr/>
+          <p:nvPr/>
+        </p:nvSpPr>
+        <p:spPr>
+          <a:xfrm>
+            <a:off x="1695634" y="1793289"/>
+            <a:ext cx="3284739" cy="2192785"/>
+          </a:xfrm>
+          <a:prstGeom prst="rect">
+            <a:avLst/>
+          </a:prstGeom>
+          <a:noFill/>
+          <a:ln w="76200"/>
+        </p:spPr>
+        <p:style>
+          <a:lnRef idx="2">
+            <a:schemeClr val="accent5"/>
+          </a:lnRef>
+          <a:fillRef idx="1">
+            <a:schemeClr val="lt1"/>
+          </a:fillRef>
+          <a:effectRef idx="0">
+            <a:schemeClr val="accent5"/>
+          </a:effectRef>
+          <a:fontRef idx="minor">
+            <a:schemeClr val="dk1"/>
+          </a:fontRef>
+        </p:style>
+        <p:txBody>
+          <a:bodyPr rtlCol="0" anchor="ctr"/>
+          <a:lstStyle/>
+          <a:p>
+            <a:pPr algn="ctr"/>
+            <a:endParaRPr lang="en-US"/>
+          </a:p>
+        </p:txBody>
+      </p:sp>
+      <p:sp>
+        <p:nvSpPr>
+          <p:cNvPr id="5" name="Rectangle 4">
+            <a:extLst>
+              <a:ext uri="{FF2B5EF4-FFF2-40B4-BE49-F238E27FC236}">
+                <a16:creationId xmlns:a16="http://schemas.microsoft.com/office/drawing/2014/main" id="{78F375BE-F64B-4325-289D-72AE421C3D25}"/>
+              </a:ext>
+            </a:extLst>
+          </p:cNvPr>
+          <p:cNvSpPr/>
+          <p:nvPr/>
+        </p:nvSpPr>
+        <p:spPr>
+          <a:xfrm>
+            <a:off x="2007832" y="2354062"/>
+            <a:ext cx="2670700" cy="389138"/>
+          </a:xfrm>
+          <a:prstGeom prst="rect">
+            <a:avLst/>
+          </a:prstGeom>
+          <a:noFill/>
+          <a:ln w="38100"/>
+        </p:spPr>
+        <p:style>
+          <a:lnRef idx="2">
+            <a:schemeClr val="accent5"/>
+          </a:lnRef>
+          <a:fillRef idx="1">
+            <a:schemeClr val="lt1"/>
+          </a:fillRef>
+          <a:effectRef idx="0">
+            <a:schemeClr val="accent5"/>
+          </a:effectRef>
+          <a:fontRef idx="minor">
+            <a:schemeClr val="dk1"/>
+          </a:fontRef>
+        </p:style>
+        <p:txBody>
+          <a:bodyPr rtlCol="0" anchor="ctr"/>
+          <a:lstStyle/>
+          <a:p>
+            <a:pPr algn="ctr"/>
+            <a:endParaRPr lang="en-US"/>
+          </a:p>
+        </p:txBody>
+      </p:sp>
+      <p:sp>
+        <p:nvSpPr>
+          <p:cNvPr id="6" name="TextBox 5">
+            <a:extLst>
+              <a:ext uri="{FF2B5EF4-FFF2-40B4-BE49-F238E27FC236}">
+                <a16:creationId xmlns:a16="http://schemas.microsoft.com/office/drawing/2014/main" id="{47FAA9B6-07E1-6211-9CA3-9E6F2DBC1515}"/>
+              </a:ext>
+            </a:extLst>
+          </p:cNvPr>
+          <p:cNvSpPr txBox="1"/>
+          <p:nvPr/>
+        </p:nvSpPr>
+        <p:spPr>
+          <a:xfrm>
+            <a:off x="1892421" y="1984730"/>
+            <a:ext cx="2049263" cy="369332"/>
+          </a:xfrm>
+          <a:prstGeom prst="rect">
+            <a:avLst/>
+          </a:prstGeom>
+          <a:noFill/>
+        </p:spPr>
+        <p:txBody>
+          <a:bodyPr wrap="square" rtlCol="0">
+            <a:spAutoFit/>
+          </a:bodyPr>
+          <a:lstStyle/>
+          <a:p>
+            <a:r>
+              <a:rPr lang="en-US" dirty="0"/>
+              <a:t>Location Name</a:t>
+            </a:r>
+          </a:p>
+        </p:txBody>
+      </p:sp>
+      <p:sp>
+        <p:nvSpPr>
+          <p:cNvPr id="7" name="Rectangle 6">
+            <a:extLst>
+              <a:ext uri="{FF2B5EF4-FFF2-40B4-BE49-F238E27FC236}">
+                <a16:creationId xmlns:a16="http://schemas.microsoft.com/office/drawing/2014/main" id="{0DB2483E-890B-DDD5-D679-28D2D7F3AC23}"/>
+              </a:ext>
+            </a:extLst>
+          </p:cNvPr>
+          <p:cNvSpPr/>
+          <p:nvPr/>
+        </p:nvSpPr>
+        <p:spPr>
+          <a:xfrm>
+            <a:off x="2007832" y="3215133"/>
+            <a:ext cx="2670700" cy="389138"/>
+          </a:xfrm>
+          <a:prstGeom prst="rect">
+            <a:avLst/>
+          </a:prstGeom>
+          <a:noFill/>
+          <a:ln w="38100"/>
+        </p:spPr>
+        <p:style>
+          <a:lnRef idx="2">
+            <a:schemeClr val="accent5"/>
+          </a:lnRef>
+          <a:fillRef idx="1">
+            <a:schemeClr val="lt1"/>
+          </a:fillRef>
+          <a:effectRef idx="0">
+            <a:schemeClr val="accent5"/>
+          </a:effectRef>
+          <a:fontRef idx="minor">
+            <a:schemeClr val="dk1"/>
+          </a:fontRef>
+        </p:style>
+        <p:txBody>
+          <a:bodyPr rtlCol="0" anchor="ctr"/>
+          <a:lstStyle/>
+          <a:p>
+            <a:pPr algn="ctr"/>
+            <a:endParaRPr lang="en-US"/>
+          </a:p>
+        </p:txBody>
+      </p:sp>
+      <p:sp>
+        <p:nvSpPr>
+          <p:cNvPr id="8" name="TextBox 7">
+            <a:extLst>
+              <a:ext uri="{FF2B5EF4-FFF2-40B4-BE49-F238E27FC236}">
+                <a16:creationId xmlns:a16="http://schemas.microsoft.com/office/drawing/2014/main" id="{8B08C149-BE25-DD26-9A96-2A87D1A3D3CF}"/>
+              </a:ext>
+            </a:extLst>
+          </p:cNvPr>
+          <p:cNvSpPr txBox="1"/>
+          <p:nvPr/>
+        </p:nvSpPr>
+        <p:spPr>
+          <a:xfrm>
+            <a:off x="1892421" y="2845801"/>
+            <a:ext cx="2049263" cy="369332"/>
+          </a:xfrm>
+          <a:prstGeom prst="rect">
+            <a:avLst/>
+          </a:prstGeom>
+          <a:noFill/>
+        </p:spPr>
+        <p:txBody>
+          <a:bodyPr wrap="square" rtlCol="0">
+            <a:spAutoFit/>
+          </a:bodyPr>
+          <a:lstStyle/>
+          <a:p>
+            <a:r>
+              <a:rPr lang="en-US" dirty="0"/>
+              <a:t>Endpoint</a:t>
+            </a:r>
+          </a:p>
+        </p:txBody>
+      </p:sp>
+      <p:sp>
+        <p:nvSpPr>
+          <p:cNvPr id="9" name="TextBox 8">
+            <a:extLst>
+              <a:ext uri="{FF2B5EF4-FFF2-40B4-BE49-F238E27FC236}">
+                <a16:creationId xmlns:a16="http://schemas.microsoft.com/office/drawing/2014/main" id="{2E4B752B-2DA0-AA20-4204-E68ABC7BC367}"/>
+              </a:ext>
+            </a:extLst>
+          </p:cNvPr>
+          <p:cNvSpPr txBox="1"/>
+          <p:nvPr/>
+        </p:nvSpPr>
+        <p:spPr>
+          <a:xfrm>
+            <a:off x="2116344" y="2394742"/>
+            <a:ext cx="1053494" cy="307777"/>
+          </a:xfrm>
+          <a:prstGeom prst="rect">
+            <a:avLst/>
+          </a:prstGeom>
+          <a:noFill/>
+        </p:spPr>
+        <p:txBody>
+          <a:bodyPr wrap="none" rtlCol="0">
+            <a:spAutoFit/>
+          </a:bodyPr>
+          <a:lstStyle/>
+          <a:p>
+            <a:r>
+              <a:rPr lang="en-US" sz="1400" i="1" dirty="0"/>
+              <a:t>Acme North</a:t>
+            </a:r>
+          </a:p>
+        </p:txBody>
+      </p:sp>
+      <p:sp>
+        <p:nvSpPr>
+          <p:cNvPr id="10" name="TextBox 9">
+            <a:extLst>
+              <a:ext uri="{FF2B5EF4-FFF2-40B4-BE49-F238E27FC236}">
+                <a16:creationId xmlns:a16="http://schemas.microsoft.com/office/drawing/2014/main" id="{037A2F95-BC2D-912D-22CD-416316B730FF}"/>
+              </a:ext>
+            </a:extLst>
+          </p:cNvPr>
+          <p:cNvSpPr txBox="1"/>
+          <p:nvPr/>
+        </p:nvSpPr>
+        <p:spPr>
+          <a:xfrm>
+            <a:off x="2116343" y="3255813"/>
+            <a:ext cx="2148345" cy="307777"/>
+          </a:xfrm>
+          <a:prstGeom prst="rect">
+            <a:avLst/>
+          </a:prstGeom>
+          <a:noFill/>
+        </p:spPr>
+        <p:txBody>
+          <a:bodyPr wrap="none" rtlCol="0">
+            <a:spAutoFit/>
+          </a:bodyPr>
+          <a:lstStyle/>
+          <a:p>
+            <a:r>
+              <a:rPr lang="en-US" sz="1400" i="1" dirty="0"/>
+              <a:t>http://acme.org/north/fhir</a:t>
+            </a:r>
+          </a:p>
+        </p:txBody>
+      </p:sp>
+    </p:spTree>
+    <p:extLst>
+      <p:ext uri="{BB962C8B-B14F-4D97-AF65-F5344CB8AC3E}">
+        <p14:creationId xmlns:p14="http://schemas.microsoft.com/office/powerpoint/2010/main" val="356441048"/>
+      </p:ext>
+    </p:extLst>
+  </p:cSld>
+  <p:clrMapOvr>
+    <a:masterClrMapping/>
+  </p:clrMapOvr>
+</p:sld>
+</file>
+
+<file path=ppt/slides/slide8.xml><?xml version="1.0" encoding="utf-8"?>
+<p:sld xmlns:a="http://schemas.openxmlformats.org/drawingml/2006/main" xmlns:r="http://schemas.openxmlformats.org/officeDocument/2006/relationships" xmlns:p="http://schemas.openxmlformats.org/presentationml/2006/main">
+  <p:cSld>
+    <p:spTree>
+      <p:nvGrpSpPr>
+        <p:cNvPr id="1" name=""/>
+        <p:cNvGrpSpPr/>
+        <p:nvPr/>
+      </p:nvGrpSpPr>
+      <p:grpSpPr>
+        <a:xfrm>
+          <a:off x="0" y="0"/>
+          <a:ext cx="0" cy="0"/>
+          <a:chOff x="0" y="0"/>
+          <a:chExt cx="0" cy="0"/>
+        </a:xfrm>
+      </p:grpSpPr>
+      <p:sp>
+        <p:nvSpPr>
+          <p:cNvPr id="25" name="Rectangle 24">
+            <a:extLst>
+              <a:ext uri="{FF2B5EF4-FFF2-40B4-BE49-F238E27FC236}">
+                <a16:creationId xmlns:a16="http://schemas.microsoft.com/office/drawing/2014/main" id="{75D81810-967D-7E6B-DC19-581966922FFB}"/>
+              </a:ext>
+            </a:extLst>
+          </p:cNvPr>
+          <p:cNvSpPr/>
+          <p:nvPr/>
+        </p:nvSpPr>
+        <p:spPr>
+          <a:xfrm>
+            <a:off x="1307486" y="2931231"/>
+            <a:ext cx="2437901" cy="292181"/>
+          </a:xfrm>
+          <a:prstGeom prst="rect">
+            <a:avLst/>
+          </a:prstGeom>
+          <a:solidFill>
+            <a:schemeClr val="tx2">
+              <a:lumMod val="20000"/>
+              <a:lumOff val="80000"/>
+            </a:schemeClr>
+          </a:solidFill>
+        </p:spPr>
+        <p:style>
+          <a:lnRef idx="2">
+            <a:schemeClr val="accent1">
+              <a:shade val="50000"/>
+            </a:schemeClr>
+          </a:lnRef>
+          <a:fillRef idx="1">
+            <a:schemeClr val="accent1"/>
+          </a:fillRef>
+          <a:effectRef idx="0">
+            <a:schemeClr val="accent1"/>
+          </a:effectRef>
+          <a:fontRef idx="minor">
+            <a:schemeClr val="lt1"/>
+          </a:fontRef>
+        </p:style>
+        <p:txBody>
+          <a:bodyPr rtlCol="0" anchor="ctr"/>
+          <a:lstStyle/>
+          <a:p>
+            <a:pPr algn="ctr"/>
+            <a:endParaRPr lang="en-US">
+              <a:ln>
+                <a:solidFill>
+                  <a:schemeClr val="accent1">
+                    <a:lumMod val="20000"/>
+                    <a:lumOff val="80000"/>
+                  </a:schemeClr>
+                </a:solidFill>
+              </a:ln>
+            </a:endParaRPr>
+          </a:p>
+        </p:txBody>
+      </p:sp>
+      <p:sp>
+        <p:nvSpPr>
+          <p:cNvPr id="2" name="Title 1">
+            <a:extLst>
+              <a:ext uri="{FF2B5EF4-FFF2-40B4-BE49-F238E27FC236}">
+                <a16:creationId xmlns:a16="http://schemas.microsoft.com/office/drawing/2014/main" id="{6759B6C7-20B8-D896-C0C9-0EAA399421D6}"/>
+              </a:ext>
+            </a:extLst>
+          </p:cNvPr>
+          <p:cNvSpPr>
+            <a:spLocks noGrp="1"/>
+          </p:cNvSpPr>
+          <p:nvPr>
+            <p:ph type="title"/>
+          </p:nvPr>
+        </p:nvSpPr>
+        <p:spPr/>
+        <p:txBody>
+          <a:bodyPr/>
+          <a:lstStyle/>
+          <a:p>
+            <a:r>
+              <a:rPr lang="en-US" dirty="0"/>
+              <a:t>Validation</a:t>
+            </a:r>
+          </a:p>
+        </p:txBody>
+      </p:sp>
+      <p:sp>
+        <p:nvSpPr>
+          <p:cNvPr id="4" name="Rectangle 3">
+            <a:extLst>
+              <a:ext uri="{FF2B5EF4-FFF2-40B4-BE49-F238E27FC236}">
+                <a16:creationId xmlns:a16="http://schemas.microsoft.com/office/drawing/2014/main" id="{D505AB8B-406D-0E1A-169A-39488A5C1B50}"/>
+              </a:ext>
+            </a:extLst>
+          </p:cNvPr>
+          <p:cNvSpPr/>
+          <p:nvPr/>
+        </p:nvSpPr>
+        <p:spPr>
+          <a:xfrm>
+            <a:off x="985421" y="1580225"/>
+            <a:ext cx="10271464" cy="4912650"/>
+          </a:xfrm>
+          <a:prstGeom prst="rect">
+            <a:avLst/>
+          </a:prstGeom>
+          <a:noFill/>
+          <a:ln w="76200"/>
+        </p:spPr>
+        <p:style>
+          <a:lnRef idx="2">
+            <a:schemeClr val="accent5"/>
+          </a:lnRef>
+          <a:fillRef idx="1">
+            <a:schemeClr val="lt1"/>
+          </a:fillRef>
+          <a:effectRef idx="0">
+            <a:schemeClr val="accent5"/>
+          </a:effectRef>
+          <a:fontRef idx="minor">
+            <a:schemeClr val="dk1"/>
+          </a:fontRef>
+        </p:style>
+        <p:txBody>
+          <a:bodyPr rtlCol="0" anchor="ctr"/>
+          <a:lstStyle/>
+          <a:p>
+            <a:pPr algn="ctr"/>
+            <a:endParaRPr lang="en-US"/>
+          </a:p>
+        </p:txBody>
+      </p:sp>
+      <p:sp>
+        <p:nvSpPr>
+          <p:cNvPr id="5" name="Rectangle 4">
+            <a:extLst>
+              <a:ext uri="{FF2B5EF4-FFF2-40B4-BE49-F238E27FC236}">
+                <a16:creationId xmlns:a16="http://schemas.microsoft.com/office/drawing/2014/main" id="{F1CF6129-7598-F888-44D7-927C5CCD900D}"/>
+              </a:ext>
+            </a:extLst>
+          </p:cNvPr>
+          <p:cNvSpPr/>
+          <p:nvPr/>
+        </p:nvSpPr>
+        <p:spPr>
+          <a:xfrm>
+            <a:off x="1191087" y="2060020"/>
+            <a:ext cx="2670700" cy="389138"/>
+          </a:xfrm>
+          <a:prstGeom prst="rect">
+            <a:avLst/>
+          </a:prstGeom>
+          <a:noFill/>
+          <a:ln w="38100"/>
+        </p:spPr>
+        <p:style>
+          <a:lnRef idx="2">
+            <a:schemeClr val="accent5"/>
+          </a:lnRef>
+          <a:fillRef idx="1">
+            <a:schemeClr val="lt1"/>
+          </a:fillRef>
+          <a:effectRef idx="0">
+            <a:schemeClr val="accent5"/>
+          </a:effectRef>
+          <a:fontRef idx="minor">
+            <a:schemeClr val="dk1"/>
+          </a:fontRef>
+        </p:style>
+        <p:txBody>
+          <a:bodyPr rtlCol="0" anchor="ctr"/>
+          <a:lstStyle/>
+          <a:p>
+            <a:pPr algn="ctr"/>
+            <a:endParaRPr lang="en-US"/>
+          </a:p>
+        </p:txBody>
+      </p:sp>
+      <p:sp>
+        <p:nvSpPr>
+          <p:cNvPr id="6" name="TextBox 5">
+            <a:extLst>
+              <a:ext uri="{FF2B5EF4-FFF2-40B4-BE49-F238E27FC236}">
+                <a16:creationId xmlns:a16="http://schemas.microsoft.com/office/drawing/2014/main" id="{C998DF69-47E9-AFF6-4C08-A0E8696F0939}"/>
+              </a:ext>
+            </a:extLst>
+          </p:cNvPr>
+          <p:cNvSpPr txBox="1"/>
+          <p:nvPr/>
+        </p:nvSpPr>
+        <p:spPr>
+          <a:xfrm>
+            <a:off x="1075676" y="1690688"/>
+            <a:ext cx="2049263" cy="369332"/>
+          </a:xfrm>
+          <a:prstGeom prst="rect">
+            <a:avLst/>
+          </a:prstGeom>
+          <a:noFill/>
+        </p:spPr>
+        <p:txBody>
+          <a:bodyPr wrap="square" rtlCol="0">
+            <a:spAutoFit/>
+          </a:bodyPr>
+          <a:lstStyle/>
+          <a:p>
+            <a:r>
+              <a:rPr lang="en-US" dirty="0"/>
+              <a:t>Organization Name</a:t>
+            </a:r>
+          </a:p>
+        </p:txBody>
+      </p:sp>
+      <p:sp>
+        <p:nvSpPr>
+          <p:cNvPr id="7" name="TextBox 6">
+            <a:extLst>
+              <a:ext uri="{FF2B5EF4-FFF2-40B4-BE49-F238E27FC236}">
+                <a16:creationId xmlns:a16="http://schemas.microsoft.com/office/drawing/2014/main" id="{D8BA6174-529F-AC25-1F44-B7531A487BF8}"/>
+              </a:ext>
+            </a:extLst>
+          </p:cNvPr>
+          <p:cNvSpPr txBox="1"/>
+          <p:nvPr/>
+        </p:nvSpPr>
+        <p:spPr>
+          <a:xfrm>
+            <a:off x="1299599" y="2100700"/>
+            <a:ext cx="2222853" cy="307777"/>
+          </a:xfrm>
+          <a:prstGeom prst="rect">
+            <a:avLst/>
+          </a:prstGeom>
+          <a:noFill/>
+        </p:spPr>
+        <p:txBody>
+          <a:bodyPr wrap="none" rtlCol="0">
+            <a:spAutoFit/>
+          </a:bodyPr>
+          <a:lstStyle/>
+          <a:p>
+            <a:r>
+              <a:rPr lang="en-US" sz="1400" i="1" dirty="0"/>
+              <a:t>Acme Provider Organization</a:t>
+            </a:r>
+          </a:p>
+        </p:txBody>
+      </p:sp>
+      <p:sp>
+        <p:nvSpPr>
+          <p:cNvPr id="8" name="Rectangle 7">
+            <a:extLst>
+              <a:ext uri="{FF2B5EF4-FFF2-40B4-BE49-F238E27FC236}">
+                <a16:creationId xmlns:a16="http://schemas.microsoft.com/office/drawing/2014/main" id="{87338689-9388-B277-0D0F-1E194661C6CC}"/>
+              </a:ext>
+            </a:extLst>
+          </p:cNvPr>
+          <p:cNvSpPr/>
+          <p:nvPr/>
+        </p:nvSpPr>
+        <p:spPr>
+          <a:xfrm>
+            <a:off x="4009008" y="2060020"/>
+            <a:ext cx="2670700" cy="389138"/>
+          </a:xfrm>
+          <a:prstGeom prst="rect">
+            <a:avLst/>
+          </a:prstGeom>
+          <a:noFill/>
+          <a:ln w="38100"/>
+        </p:spPr>
+        <p:style>
+          <a:lnRef idx="2">
+            <a:schemeClr val="accent5"/>
+          </a:lnRef>
+          <a:fillRef idx="1">
+            <a:schemeClr val="lt1"/>
+          </a:fillRef>
+          <a:effectRef idx="0">
+            <a:schemeClr val="accent5"/>
+          </a:effectRef>
+          <a:fontRef idx="minor">
+            <a:schemeClr val="dk1"/>
+          </a:fontRef>
+        </p:style>
+        <p:txBody>
+          <a:bodyPr rtlCol="0" anchor="ctr"/>
+          <a:lstStyle/>
+          <a:p>
+            <a:pPr algn="ctr"/>
+            <a:endParaRPr lang="en-US"/>
+          </a:p>
+        </p:txBody>
+      </p:sp>
+      <p:sp>
+        <p:nvSpPr>
+          <p:cNvPr id="9" name="TextBox 8">
+            <a:extLst>
+              <a:ext uri="{FF2B5EF4-FFF2-40B4-BE49-F238E27FC236}">
+                <a16:creationId xmlns:a16="http://schemas.microsoft.com/office/drawing/2014/main" id="{9F01EDD4-F8CE-BE58-0CCC-FCDB042C624D}"/>
+              </a:ext>
+            </a:extLst>
+          </p:cNvPr>
+          <p:cNvSpPr txBox="1"/>
+          <p:nvPr/>
+        </p:nvSpPr>
+        <p:spPr>
+          <a:xfrm>
+            <a:off x="3893597" y="1690688"/>
+            <a:ext cx="2049263" cy="369332"/>
+          </a:xfrm>
+          <a:prstGeom prst="rect">
+            <a:avLst/>
+          </a:prstGeom>
+          <a:noFill/>
+        </p:spPr>
+        <p:txBody>
+          <a:bodyPr wrap="square" rtlCol="0">
+            <a:spAutoFit/>
+          </a:bodyPr>
+          <a:lstStyle/>
+          <a:p>
+            <a:r>
+              <a:rPr lang="en-US" dirty="0"/>
+              <a:t>Location Name</a:t>
+            </a:r>
+          </a:p>
+        </p:txBody>
+      </p:sp>
+      <p:sp>
+        <p:nvSpPr>
+          <p:cNvPr id="10" name="TextBox 9">
+            <a:extLst>
+              <a:ext uri="{FF2B5EF4-FFF2-40B4-BE49-F238E27FC236}">
+                <a16:creationId xmlns:a16="http://schemas.microsoft.com/office/drawing/2014/main" id="{A06AD6B3-23DF-6FB2-6F72-74CC027561EB}"/>
+              </a:ext>
+            </a:extLst>
+          </p:cNvPr>
+          <p:cNvSpPr txBox="1"/>
+          <p:nvPr/>
+        </p:nvSpPr>
+        <p:spPr>
+          <a:xfrm>
+            <a:off x="4117520" y="2100700"/>
+            <a:ext cx="1053494" cy="307777"/>
+          </a:xfrm>
+          <a:prstGeom prst="rect">
+            <a:avLst/>
+          </a:prstGeom>
+          <a:noFill/>
+        </p:spPr>
+        <p:txBody>
+          <a:bodyPr wrap="none" rtlCol="0">
+            <a:spAutoFit/>
+          </a:bodyPr>
+          <a:lstStyle/>
+          <a:p>
+            <a:r>
+              <a:rPr lang="en-US" sz="1400" i="1" dirty="0"/>
+              <a:t>Acme North</a:t>
+            </a:r>
+          </a:p>
+        </p:txBody>
+      </p:sp>
+      <p:sp>
+        <p:nvSpPr>
+          <p:cNvPr id="11" name="Rectangle 10">
+            <a:extLst>
+              <a:ext uri="{FF2B5EF4-FFF2-40B4-BE49-F238E27FC236}">
+                <a16:creationId xmlns:a16="http://schemas.microsoft.com/office/drawing/2014/main" id="{4ADC7F10-475E-A1B1-7754-83E8803C42F4}"/>
+              </a:ext>
+            </a:extLst>
+          </p:cNvPr>
+          <p:cNvSpPr/>
+          <p:nvPr/>
+        </p:nvSpPr>
+        <p:spPr>
+          <a:xfrm>
+            <a:off x="6781803" y="2060020"/>
+            <a:ext cx="2670700" cy="389138"/>
+          </a:xfrm>
+          <a:prstGeom prst="rect">
+            <a:avLst/>
+          </a:prstGeom>
+          <a:noFill/>
+          <a:ln w="38100"/>
+        </p:spPr>
+        <p:style>
+          <a:lnRef idx="2">
+            <a:schemeClr val="accent5"/>
+          </a:lnRef>
+          <a:fillRef idx="1">
+            <a:schemeClr val="lt1"/>
+          </a:fillRef>
+          <a:effectRef idx="0">
+            <a:schemeClr val="accent5"/>
+          </a:effectRef>
+          <a:fontRef idx="minor">
+            <a:schemeClr val="dk1"/>
+          </a:fontRef>
+        </p:style>
+        <p:txBody>
+          <a:bodyPr rtlCol="0" anchor="ctr"/>
+          <a:lstStyle/>
+          <a:p>
+            <a:pPr algn="ctr"/>
+            <a:endParaRPr lang="en-US"/>
+          </a:p>
+        </p:txBody>
+      </p:sp>
+      <p:sp>
+        <p:nvSpPr>
+          <p:cNvPr id="12" name="TextBox 11">
+            <a:extLst>
+              <a:ext uri="{FF2B5EF4-FFF2-40B4-BE49-F238E27FC236}">
+                <a16:creationId xmlns:a16="http://schemas.microsoft.com/office/drawing/2014/main" id="{362E08E5-3C68-AD13-20CF-C6AE3F74EADE}"/>
+              </a:ext>
+            </a:extLst>
+          </p:cNvPr>
+          <p:cNvSpPr txBox="1"/>
+          <p:nvPr/>
+        </p:nvSpPr>
+        <p:spPr>
+          <a:xfrm>
+            <a:off x="6666392" y="1690688"/>
+            <a:ext cx="2049263" cy="369332"/>
+          </a:xfrm>
+          <a:prstGeom prst="rect">
+            <a:avLst/>
+          </a:prstGeom>
+          <a:noFill/>
+        </p:spPr>
+        <p:txBody>
+          <a:bodyPr wrap="square" rtlCol="0">
+            <a:spAutoFit/>
+          </a:bodyPr>
+          <a:lstStyle/>
+          <a:p>
+            <a:r>
+              <a:rPr lang="en-US" dirty="0"/>
+              <a:t>Measure</a:t>
+            </a:r>
+          </a:p>
+        </p:txBody>
+      </p:sp>
+      <p:sp>
+        <p:nvSpPr>
+          <p:cNvPr id="13" name="TextBox 12">
+            <a:extLst>
+              <a:ext uri="{FF2B5EF4-FFF2-40B4-BE49-F238E27FC236}">
+                <a16:creationId xmlns:a16="http://schemas.microsoft.com/office/drawing/2014/main" id="{11AD3441-51D5-F254-2BD4-D6EE7242D4A2}"/>
+              </a:ext>
+            </a:extLst>
+          </p:cNvPr>
+          <p:cNvSpPr txBox="1"/>
+          <p:nvPr/>
+        </p:nvSpPr>
+        <p:spPr>
+          <a:xfrm>
+            <a:off x="6890315" y="2100700"/>
+            <a:ext cx="2374240" cy="307777"/>
+          </a:xfrm>
+          <a:prstGeom prst="rect">
+            <a:avLst/>
+          </a:prstGeom>
+          <a:noFill/>
+        </p:spPr>
+        <p:txBody>
+          <a:bodyPr wrap="none" rtlCol="0">
+            <a:spAutoFit/>
+          </a:bodyPr>
+          <a:lstStyle/>
+          <a:p>
+            <a:r>
+              <a:rPr lang="en-US" sz="1400" i="1" dirty="0"/>
+              <a:t>Discharged on Antithrombotic</a:t>
+            </a:r>
+          </a:p>
+        </p:txBody>
+      </p:sp>
+      <p:sp>
+        <p:nvSpPr>
+          <p:cNvPr id="14" name="Rectangle 13">
+            <a:extLst>
+              <a:ext uri="{FF2B5EF4-FFF2-40B4-BE49-F238E27FC236}">
+                <a16:creationId xmlns:a16="http://schemas.microsoft.com/office/drawing/2014/main" id="{8D43390B-490D-5C13-F8B3-C355E22C5D44}"/>
+              </a:ext>
+            </a:extLst>
+          </p:cNvPr>
+          <p:cNvSpPr/>
+          <p:nvPr/>
+        </p:nvSpPr>
+        <p:spPr>
+          <a:xfrm>
+            <a:off x="9567914" y="2060020"/>
+            <a:ext cx="1548410" cy="389138"/>
+          </a:xfrm>
+          <a:prstGeom prst="rect">
+            <a:avLst/>
+          </a:prstGeom>
+          <a:noFill/>
+          <a:ln w="38100"/>
+        </p:spPr>
+        <p:style>
+          <a:lnRef idx="2">
+            <a:schemeClr val="accent5"/>
+          </a:lnRef>
+          <a:fillRef idx="1">
+            <a:schemeClr val="lt1"/>
+          </a:fillRef>
+          <a:effectRef idx="0">
+            <a:schemeClr val="accent5"/>
+          </a:effectRef>
+          <a:fontRef idx="minor">
+            <a:schemeClr val="dk1"/>
+          </a:fontRef>
+        </p:style>
+        <p:txBody>
+          <a:bodyPr rtlCol="0" anchor="ctr"/>
+          <a:lstStyle/>
+          <a:p>
+            <a:pPr algn="ctr"/>
+            <a:endParaRPr lang="en-US"/>
+          </a:p>
+        </p:txBody>
+      </p:sp>
+      <p:sp>
+        <p:nvSpPr>
+          <p:cNvPr id="15" name="TextBox 14">
+            <a:extLst>
+              <a:ext uri="{FF2B5EF4-FFF2-40B4-BE49-F238E27FC236}">
+                <a16:creationId xmlns:a16="http://schemas.microsoft.com/office/drawing/2014/main" id="{1084D3C0-520C-0151-6C98-DD54E6726F02}"/>
+              </a:ext>
+            </a:extLst>
+          </p:cNvPr>
+          <p:cNvSpPr txBox="1"/>
+          <p:nvPr/>
+        </p:nvSpPr>
+        <p:spPr>
+          <a:xfrm>
+            <a:off x="9452503" y="1690688"/>
+            <a:ext cx="2049263" cy="369332"/>
+          </a:xfrm>
+          <a:prstGeom prst="rect">
+            <a:avLst/>
+          </a:prstGeom>
+          <a:noFill/>
+        </p:spPr>
+        <p:txBody>
+          <a:bodyPr wrap="square" rtlCol="0">
+            <a:spAutoFit/>
+          </a:bodyPr>
+          <a:lstStyle/>
+          <a:p>
+            <a:r>
+              <a:rPr lang="en-US" dirty="0"/>
+              <a:t>Period</a:t>
+            </a:r>
+          </a:p>
+        </p:txBody>
+      </p:sp>
+      <p:sp>
+        <p:nvSpPr>
+          <p:cNvPr id="16" name="TextBox 15">
+            <a:extLst>
+              <a:ext uri="{FF2B5EF4-FFF2-40B4-BE49-F238E27FC236}">
+                <a16:creationId xmlns:a16="http://schemas.microsoft.com/office/drawing/2014/main" id="{F4AB31CB-9DE7-B1E3-1058-0B04341910E8}"/>
+              </a:ext>
+            </a:extLst>
+          </p:cNvPr>
+          <p:cNvSpPr txBox="1"/>
+          <p:nvPr/>
+        </p:nvSpPr>
+        <p:spPr>
+          <a:xfrm>
+            <a:off x="9676426" y="2100700"/>
+            <a:ext cx="394660" cy="307777"/>
+          </a:xfrm>
+          <a:prstGeom prst="rect">
+            <a:avLst/>
+          </a:prstGeom>
+          <a:noFill/>
+        </p:spPr>
+        <p:txBody>
+          <a:bodyPr wrap="none" rtlCol="0">
+            <a:spAutoFit/>
+          </a:bodyPr>
+          <a:lstStyle/>
+          <a:p>
+            <a:r>
+              <a:rPr lang="en-US" sz="1400" i="1" dirty="0"/>
+              <a:t>Q1</a:t>
+            </a:r>
+          </a:p>
+        </p:txBody>
+      </p:sp>
+      <p:sp>
+        <p:nvSpPr>
+          <p:cNvPr id="17" name="Rectangle 16">
+            <a:extLst>
+              <a:ext uri="{FF2B5EF4-FFF2-40B4-BE49-F238E27FC236}">
+                <a16:creationId xmlns:a16="http://schemas.microsoft.com/office/drawing/2014/main" id="{F8791A85-3903-D6E4-37CC-CC81E2938882}"/>
+              </a:ext>
+            </a:extLst>
+          </p:cNvPr>
+          <p:cNvSpPr/>
+          <p:nvPr/>
+        </p:nvSpPr>
+        <p:spPr>
+          <a:xfrm>
+            <a:off x="1191087" y="2878985"/>
+            <a:ext cx="2670700" cy="3433038"/>
+          </a:xfrm>
+          <a:prstGeom prst="rect">
+            <a:avLst/>
+          </a:prstGeom>
+          <a:noFill/>
+          <a:ln w="38100"/>
+        </p:spPr>
+        <p:style>
+          <a:lnRef idx="2">
+            <a:schemeClr val="accent5"/>
+          </a:lnRef>
+          <a:fillRef idx="1">
+            <a:schemeClr val="lt1"/>
+          </a:fillRef>
+          <a:effectRef idx="0">
+            <a:schemeClr val="accent5"/>
+          </a:effectRef>
+          <a:fontRef idx="minor">
+            <a:schemeClr val="dk1"/>
+          </a:fontRef>
+        </p:style>
+        <p:txBody>
+          <a:bodyPr rtlCol="0" anchor="ctr"/>
+          <a:lstStyle/>
+          <a:p>
+            <a:pPr algn="ctr"/>
+            <a:endParaRPr lang="en-US"/>
+          </a:p>
+        </p:txBody>
+      </p:sp>
+      <p:sp>
+        <p:nvSpPr>
+          <p:cNvPr id="18" name="TextBox 17">
+            <a:extLst>
+              <a:ext uri="{FF2B5EF4-FFF2-40B4-BE49-F238E27FC236}">
+                <a16:creationId xmlns:a16="http://schemas.microsoft.com/office/drawing/2014/main" id="{AC81BA28-9653-A3DF-03B6-312371628428}"/>
+              </a:ext>
+            </a:extLst>
+          </p:cNvPr>
+          <p:cNvSpPr txBox="1"/>
+          <p:nvPr/>
+        </p:nvSpPr>
+        <p:spPr>
+          <a:xfrm>
+            <a:off x="1075676" y="2509653"/>
+            <a:ext cx="2049263" cy="369332"/>
+          </a:xfrm>
+          <a:prstGeom prst="rect">
+            <a:avLst/>
+          </a:prstGeom>
+          <a:noFill/>
+        </p:spPr>
+        <p:txBody>
+          <a:bodyPr wrap="square" rtlCol="0">
+            <a:spAutoFit/>
+          </a:bodyPr>
+          <a:lstStyle/>
+          <a:p>
+            <a:r>
+              <a:rPr lang="en-US" dirty="0"/>
+              <a:t>Patients</a:t>
+            </a:r>
+          </a:p>
+        </p:txBody>
+      </p:sp>
+      <p:sp>
+        <p:nvSpPr>
+          <p:cNvPr id="19" name="TextBox 18">
+            <a:extLst>
+              <a:ext uri="{FF2B5EF4-FFF2-40B4-BE49-F238E27FC236}">
+                <a16:creationId xmlns:a16="http://schemas.microsoft.com/office/drawing/2014/main" id="{743D607E-5F2E-2E1D-BFD8-0296F46A2ECE}"/>
+              </a:ext>
+            </a:extLst>
+          </p:cNvPr>
+          <p:cNvSpPr txBox="1"/>
+          <p:nvPr/>
+        </p:nvSpPr>
+        <p:spPr>
+          <a:xfrm>
+            <a:off x="1299599" y="2919665"/>
+            <a:ext cx="1008609" cy="307777"/>
+          </a:xfrm>
+          <a:prstGeom prst="rect">
+            <a:avLst/>
+          </a:prstGeom>
+          <a:noFill/>
+        </p:spPr>
+        <p:txBody>
+          <a:bodyPr wrap="none" rtlCol="0">
+            <a:spAutoFit/>
+          </a:bodyPr>
+          <a:lstStyle/>
+          <a:p>
+            <a:r>
+              <a:rPr lang="en-US" sz="1400" i="1" dirty="0"/>
+              <a:t>John James</a:t>
+            </a:r>
+          </a:p>
+        </p:txBody>
+      </p:sp>
+      <p:sp>
+        <p:nvSpPr>
+          <p:cNvPr id="20" name="TextBox 19">
+            <a:extLst>
+              <a:ext uri="{FF2B5EF4-FFF2-40B4-BE49-F238E27FC236}">
+                <a16:creationId xmlns:a16="http://schemas.microsoft.com/office/drawing/2014/main" id="{CAE8355C-DBE7-C393-D0E9-98977DCDB75E}"/>
+              </a:ext>
+            </a:extLst>
+          </p:cNvPr>
+          <p:cNvSpPr txBox="1"/>
+          <p:nvPr/>
+        </p:nvSpPr>
+        <p:spPr>
+          <a:xfrm>
+            <a:off x="1299598" y="3248317"/>
+            <a:ext cx="1210781" cy="307777"/>
+          </a:xfrm>
+          <a:prstGeom prst="rect">
+            <a:avLst/>
+          </a:prstGeom>
+          <a:noFill/>
+        </p:spPr>
+        <p:txBody>
+          <a:bodyPr wrap="none" rtlCol="0">
+            <a:spAutoFit/>
+          </a:bodyPr>
+          <a:lstStyle/>
+          <a:p>
+            <a:r>
+              <a:rPr lang="en-US" sz="1400" i="1" dirty="0"/>
+              <a:t>Olivia Newton</a:t>
+            </a:r>
+          </a:p>
+        </p:txBody>
+      </p:sp>
+      <p:sp>
+        <p:nvSpPr>
+          <p:cNvPr id="21" name="TextBox 20">
+            <a:extLst>
+              <a:ext uri="{FF2B5EF4-FFF2-40B4-BE49-F238E27FC236}">
+                <a16:creationId xmlns:a16="http://schemas.microsoft.com/office/drawing/2014/main" id="{ACC3DBCF-79A4-063A-54D0-32094ED26B68}"/>
+              </a:ext>
+            </a:extLst>
+          </p:cNvPr>
+          <p:cNvSpPr txBox="1"/>
+          <p:nvPr/>
+        </p:nvSpPr>
+        <p:spPr>
+          <a:xfrm>
+            <a:off x="1304776" y="3592565"/>
+            <a:ext cx="1117294" cy="307777"/>
+          </a:xfrm>
+          <a:prstGeom prst="rect">
+            <a:avLst/>
+          </a:prstGeom>
+          <a:noFill/>
+        </p:spPr>
+        <p:txBody>
+          <a:bodyPr wrap="none" rtlCol="0">
+            <a:spAutoFit/>
+          </a:bodyPr>
+          <a:lstStyle/>
+          <a:p>
+            <a:r>
+              <a:rPr lang="en-US" sz="1400" i="1" dirty="0"/>
+              <a:t>Carter Quinn</a:t>
+            </a:r>
+          </a:p>
+        </p:txBody>
+      </p:sp>
+      <p:sp>
+        <p:nvSpPr>
+          <p:cNvPr id="23" name="Rectangle 22">
+            <a:extLst>
+              <a:ext uri="{FF2B5EF4-FFF2-40B4-BE49-F238E27FC236}">
+                <a16:creationId xmlns:a16="http://schemas.microsoft.com/office/drawing/2014/main" id="{B05C2593-10EA-5DF5-35D4-8689F9F499E6}"/>
+              </a:ext>
+            </a:extLst>
+          </p:cNvPr>
+          <p:cNvSpPr/>
+          <p:nvPr/>
+        </p:nvSpPr>
+        <p:spPr>
+          <a:xfrm>
+            <a:off x="4082008" y="2878985"/>
+            <a:ext cx="7034315" cy="3433038"/>
+          </a:xfrm>
+          <a:prstGeom prst="rect">
+            <a:avLst/>
+          </a:prstGeom>
+          <a:noFill/>
+          <a:ln w="38100"/>
+        </p:spPr>
+        <p:style>
+          <a:lnRef idx="2">
+            <a:schemeClr val="accent5"/>
+          </a:lnRef>
+          <a:fillRef idx="1">
+            <a:schemeClr val="lt1"/>
+          </a:fillRef>
+          <a:effectRef idx="0">
+            <a:schemeClr val="accent5"/>
+          </a:effectRef>
+          <a:fontRef idx="minor">
+            <a:schemeClr val="dk1"/>
+          </a:fontRef>
+        </p:style>
+        <p:txBody>
+          <a:bodyPr rtlCol="0" anchor="ctr"/>
+          <a:lstStyle/>
+          <a:p>
+            <a:pPr algn="ctr"/>
+            <a:endParaRPr lang="en-US" b="1" dirty="0"/>
+          </a:p>
+        </p:txBody>
+      </p:sp>
+      <p:sp>
+        <p:nvSpPr>
+          <p:cNvPr id="24" name="Rectangle 23">
+            <a:extLst>
+              <a:ext uri="{FF2B5EF4-FFF2-40B4-BE49-F238E27FC236}">
+                <a16:creationId xmlns:a16="http://schemas.microsoft.com/office/drawing/2014/main" id="{82100608-C2E5-AD3D-4439-FB9E508BBF6C}"/>
+              </a:ext>
+            </a:extLst>
+          </p:cNvPr>
+          <p:cNvSpPr/>
+          <p:nvPr/>
+        </p:nvSpPr>
+        <p:spPr>
+          <a:xfrm>
+            <a:off x="4094085" y="2878985"/>
+            <a:ext cx="2084773" cy="3433038"/>
+          </a:xfrm>
+          <a:prstGeom prst="rect">
+            <a:avLst/>
+          </a:prstGeom>
+          <a:noFill/>
+          <a:ln w="38100"/>
+        </p:spPr>
+        <p:style>
+          <a:lnRef idx="2">
+            <a:schemeClr val="accent5"/>
+          </a:lnRef>
+          <a:fillRef idx="1">
+            <a:schemeClr val="lt1"/>
+          </a:fillRef>
+          <a:effectRef idx="0">
+            <a:schemeClr val="accent5"/>
+          </a:effectRef>
+          <a:fontRef idx="minor">
+            <a:schemeClr val="dk1"/>
+          </a:fontRef>
+        </p:style>
+        <p:txBody>
+          <a:bodyPr rtlCol="0" anchor="ctr"/>
+          <a:lstStyle/>
+          <a:p>
+            <a:pPr algn="ctr"/>
+            <a:endParaRPr lang="en-US"/>
+          </a:p>
+        </p:txBody>
+      </p:sp>
+      <p:sp>
+        <p:nvSpPr>
+          <p:cNvPr id="26" name="Rectangle 25">
+            <a:extLst>
+              <a:ext uri="{FF2B5EF4-FFF2-40B4-BE49-F238E27FC236}">
+                <a16:creationId xmlns:a16="http://schemas.microsoft.com/office/drawing/2014/main" id="{3EE456F5-D6DD-C2E2-0AE9-5C5C2900EB0C}"/>
+              </a:ext>
+            </a:extLst>
+          </p:cNvPr>
+          <p:cNvSpPr/>
+          <p:nvPr/>
+        </p:nvSpPr>
+        <p:spPr>
+          <a:xfrm>
+            <a:off x="4228491" y="2975942"/>
+            <a:ext cx="1799447" cy="292181"/>
+          </a:xfrm>
+          <a:prstGeom prst="rect">
+            <a:avLst/>
+          </a:prstGeom>
+          <a:solidFill>
+            <a:schemeClr val="tx2">
+              <a:lumMod val="20000"/>
+              <a:lumOff val="80000"/>
+            </a:schemeClr>
+          </a:solidFill>
+        </p:spPr>
+        <p:style>
+          <a:lnRef idx="2">
+            <a:schemeClr val="accent1">
+              <a:shade val="50000"/>
+            </a:schemeClr>
+          </a:lnRef>
+          <a:fillRef idx="1">
+            <a:schemeClr val="accent1"/>
+          </a:fillRef>
+          <a:effectRef idx="0">
+            <a:schemeClr val="accent1"/>
+          </a:effectRef>
+          <a:fontRef idx="minor">
+            <a:schemeClr val="lt1"/>
+          </a:fontRef>
+        </p:style>
+        <p:txBody>
+          <a:bodyPr rtlCol="0" anchor="ctr"/>
+          <a:lstStyle/>
+          <a:p>
+            <a:pPr algn="ctr"/>
+            <a:endParaRPr lang="en-US">
+              <a:ln>
+                <a:solidFill>
+                  <a:schemeClr val="accent1">
+                    <a:lumMod val="20000"/>
+                    <a:lumOff val="80000"/>
+                  </a:schemeClr>
+                </a:solidFill>
+              </a:ln>
+            </a:endParaRPr>
+          </a:p>
+        </p:txBody>
+      </p:sp>
+      <p:sp>
+        <p:nvSpPr>
+          <p:cNvPr id="27" name="TextBox 26">
+            <a:extLst>
+              <a:ext uri="{FF2B5EF4-FFF2-40B4-BE49-F238E27FC236}">
+                <a16:creationId xmlns:a16="http://schemas.microsoft.com/office/drawing/2014/main" id="{1F85CAEB-4807-0914-D975-B392C7CAA660}"/>
+              </a:ext>
+            </a:extLst>
+          </p:cNvPr>
+          <p:cNvSpPr txBox="1"/>
+          <p:nvPr/>
+        </p:nvSpPr>
+        <p:spPr>
+          <a:xfrm>
+            <a:off x="4220604" y="2964376"/>
+            <a:ext cx="1337298" cy="307777"/>
+          </a:xfrm>
+          <a:prstGeom prst="rect">
+            <a:avLst/>
+          </a:prstGeom>
+          <a:noFill/>
+        </p:spPr>
+        <p:txBody>
+          <a:bodyPr wrap="square" rtlCol="0">
+            <a:spAutoFit/>
+          </a:bodyPr>
+          <a:lstStyle/>
+          <a:p>
+            <a:r>
+              <a:rPr lang="en-US" sz="1400" i="1" dirty="0"/>
+              <a:t>Encounter 123</a:t>
+            </a:r>
+          </a:p>
+        </p:txBody>
+      </p:sp>
+      <p:sp>
+        <p:nvSpPr>
+          <p:cNvPr id="28" name="TextBox 27">
+            <a:extLst>
+              <a:ext uri="{FF2B5EF4-FFF2-40B4-BE49-F238E27FC236}">
+                <a16:creationId xmlns:a16="http://schemas.microsoft.com/office/drawing/2014/main" id="{72C5DE9B-E52C-6834-1343-3020C1FAD74D}"/>
+              </a:ext>
+            </a:extLst>
+          </p:cNvPr>
+          <p:cNvSpPr txBox="1"/>
+          <p:nvPr/>
+        </p:nvSpPr>
+        <p:spPr>
+          <a:xfrm>
+            <a:off x="4220603" y="3293028"/>
+            <a:ext cx="1970332" cy="307777"/>
+          </a:xfrm>
+          <a:prstGeom prst="rect">
+            <a:avLst/>
+          </a:prstGeom>
+          <a:noFill/>
+        </p:spPr>
+        <p:txBody>
+          <a:bodyPr wrap="square" rtlCol="0">
+            <a:spAutoFit/>
+          </a:bodyPr>
+          <a:lstStyle/>
+          <a:p>
+            <a:r>
+              <a:rPr lang="en-US" sz="1400" i="1" dirty="0"/>
+              <a:t>Medication Request 899</a:t>
+            </a:r>
+          </a:p>
+        </p:txBody>
+      </p:sp>
+      <p:sp>
+        <p:nvSpPr>
+          <p:cNvPr id="29" name="TextBox 28">
+            <a:extLst>
+              <a:ext uri="{FF2B5EF4-FFF2-40B4-BE49-F238E27FC236}">
+                <a16:creationId xmlns:a16="http://schemas.microsoft.com/office/drawing/2014/main" id="{BEEDC95A-55A1-60FA-6B55-508FF8B6FA01}"/>
+              </a:ext>
+            </a:extLst>
+          </p:cNvPr>
+          <p:cNvSpPr txBox="1"/>
+          <p:nvPr/>
+        </p:nvSpPr>
+        <p:spPr>
+          <a:xfrm>
+            <a:off x="4225780" y="3637276"/>
+            <a:ext cx="1332121" cy="307777"/>
+          </a:xfrm>
+          <a:prstGeom prst="rect">
+            <a:avLst/>
+          </a:prstGeom>
+          <a:noFill/>
+        </p:spPr>
+        <p:txBody>
+          <a:bodyPr wrap="square" rtlCol="0">
+            <a:spAutoFit/>
+          </a:bodyPr>
+          <a:lstStyle/>
+          <a:p>
+            <a:r>
+              <a:rPr lang="en-US" sz="1400" i="1" dirty="0"/>
+              <a:t>Procedure 144</a:t>
+            </a:r>
+          </a:p>
+        </p:txBody>
+      </p:sp>
+      <p:sp>
+        <p:nvSpPr>
+          <p:cNvPr id="30" name="TextBox 29">
+            <a:extLst>
+              <a:ext uri="{FF2B5EF4-FFF2-40B4-BE49-F238E27FC236}">
+                <a16:creationId xmlns:a16="http://schemas.microsoft.com/office/drawing/2014/main" id="{2F434E76-F9C7-AF92-DF98-FC61AC7AC485}"/>
+              </a:ext>
+            </a:extLst>
+          </p:cNvPr>
+          <p:cNvSpPr txBox="1"/>
+          <p:nvPr/>
+        </p:nvSpPr>
+        <p:spPr>
+          <a:xfrm>
+            <a:off x="6287609" y="2975942"/>
+            <a:ext cx="2234954" cy="307777"/>
+          </a:xfrm>
+          <a:prstGeom prst="rect">
+            <a:avLst/>
+          </a:prstGeom>
+          <a:noFill/>
+        </p:spPr>
+        <p:txBody>
+          <a:bodyPr wrap="square" rtlCol="0">
+            <a:spAutoFit/>
+          </a:bodyPr>
+          <a:lstStyle/>
+          <a:p>
+            <a:r>
+              <a:rPr lang="en-US" sz="1400" i="1" dirty="0"/>
+              <a:t>2022-08-02 thru 2022-08-04</a:t>
+            </a:r>
+          </a:p>
+        </p:txBody>
+      </p:sp>
+      <p:sp>
+        <p:nvSpPr>
+          <p:cNvPr id="31" name="TextBox 30">
+            <a:extLst>
+              <a:ext uri="{FF2B5EF4-FFF2-40B4-BE49-F238E27FC236}">
+                <a16:creationId xmlns:a16="http://schemas.microsoft.com/office/drawing/2014/main" id="{90A34AB7-7C54-C95A-C5D5-3DF60079BEB2}"/>
+              </a:ext>
+            </a:extLst>
+          </p:cNvPr>
+          <p:cNvSpPr txBox="1"/>
+          <p:nvPr/>
+        </p:nvSpPr>
+        <p:spPr>
+          <a:xfrm>
+            <a:off x="6287609" y="3284788"/>
+            <a:ext cx="2616694" cy="307777"/>
+          </a:xfrm>
+          <a:prstGeom prst="rect">
+            <a:avLst/>
+          </a:prstGeom>
+          <a:noFill/>
+        </p:spPr>
+        <p:txBody>
+          <a:bodyPr wrap="square" rtlCol="0">
+            <a:spAutoFit/>
+          </a:bodyPr>
+          <a:lstStyle/>
+          <a:p>
+            <a:r>
+              <a:rPr lang="en-US" sz="1400" i="1" dirty="0"/>
+              <a:t>Hospital Admission (32485007)</a:t>
+            </a:r>
+          </a:p>
+        </p:txBody>
+      </p:sp>
+      <p:sp>
+        <p:nvSpPr>
+          <p:cNvPr id="32" name="TextBox 31">
+            <a:extLst>
+              <a:ext uri="{FF2B5EF4-FFF2-40B4-BE49-F238E27FC236}">
+                <a16:creationId xmlns:a16="http://schemas.microsoft.com/office/drawing/2014/main" id="{EEF411BE-E423-CFB4-B75E-0FB90FAD7306}"/>
+              </a:ext>
+            </a:extLst>
+          </p:cNvPr>
+          <p:cNvSpPr txBox="1"/>
+          <p:nvPr/>
+        </p:nvSpPr>
+        <p:spPr>
+          <a:xfrm>
+            <a:off x="6287608" y="3638806"/>
+            <a:ext cx="4045999" cy="307777"/>
+          </a:xfrm>
+          <a:prstGeom prst="rect">
+            <a:avLst/>
+          </a:prstGeom>
+          <a:noFill/>
+        </p:spPr>
+        <p:txBody>
+          <a:bodyPr wrap="square" rtlCol="0">
+            <a:spAutoFit/>
+          </a:bodyPr>
+          <a:lstStyle/>
+          <a:p>
+            <a:r>
+              <a:rPr lang="en-US" sz="1400" i="1" dirty="0"/>
+              <a:t>Error: If a date has a time, it must have a </a:t>
+            </a:r>
+            <a:r>
+              <a:rPr lang="en-US" sz="1400" i="1" dirty="0" err="1"/>
+              <a:t>timezone</a:t>
+            </a:r>
+            <a:r>
+              <a:rPr lang="en-US" sz="1400" i="1" dirty="0"/>
+              <a:t> </a:t>
+            </a:r>
+          </a:p>
+        </p:txBody>
+      </p:sp>
+    </p:spTree>
+    <p:extLst>
+      <p:ext uri="{BB962C8B-B14F-4D97-AF65-F5344CB8AC3E}">
+        <p14:creationId xmlns:p14="http://schemas.microsoft.com/office/powerpoint/2010/main" val="4282755694"/>
+      </p:ext>
+    </p:extLst>
+  </p:cSld>
+  <p:clrMapOvr>
+    <a:masterClrMapping/>
+  </p:clrMapOvr>
+</p:sld>
+</file>
+
+<file path=ppt/slides/slide9.xml><?xml version="1.0" encoding="utf-8"?>
+<p:sld xmlns:a="http://schemas.openxmlformats.org/drawingml/2006/main" xmlns:r="http://schemas.openxmlformats.org/officeDocument/2006/relationships" xmlns:p="http://schemas.openxmlformats.org/presentationml/2006/main">
+  <p:cSld>
+    <p:spTree>
+      <p:nvGrpSpPr>
+        <p:cNvPr id="1" name=""/>
+        <p:cNvGrpSpPr/>
+        <p:nvPr/>
+      </p:nvGrpSpPr>
+      <p:grpSpPr>
+        <a:xfrm>
+          <a:off x="0" y="0"/>
+          <a:ext cx="0" cy="0"/>
+          <a:chOff x="0" y="0"/>
+          <a:chExt cx="0" cy="0"/>
+        </a:xfrm>
+      </p:grpSpPr>
+      <p:sp>
+        <p:nvSpPr>
+          <p:cNvPr id="2" name="Title 1">
+            <a:extLst>
+              <a:ext uri="{FF2B5EF4-FFF2-40B4-BE49-F238E27FC236}">
+                <a16:creationId xmlns:a16="http://schemas.microsoft.com/office/drawing/2014/main" id="{DF4FEFFF-26E5-B721-DD5B-0AD2752BD85A}"/>
+              </a:ext>
+            </a:extLst>
+          </p:cNvPr>
+          <p:cNvSpPr>
+            <a:spLocks noGrp="1"/>
+          </p:cNvSpPr>
+          <p:nvPr>
+            <p:ph type="title"/>
+          </p:nvPr>
+        </p:nvSpPr>
+        <p:spPr/>
+        <p:txBody>
+          <a:bodyPr/>
+          <a:lstStyle/>
+          <a:p>
+            <a:r>
+              <a:rPr lang="en-US" dirty="0"/>
+              <a:t>Reporting Submission</a:t>
+            </a:r>
+          </a:p>
+        </p:txBody>
+      </p:sp>
+      <p:sp>
+        <p:nvSpPr>
+          <p:cNvPr id="5" name="Rectangle 4">
+            <a:extLst>
+              <a:ext uri="{FF2B5EF4-FFF2-40B4-BE49-F238E27FC236}">
+                <a16:creationId xmlns:a16="http://schemas.microsoft.com/office/drawing/2014/main" id="{4C4491E3-F476-E28A-732F-5E6331F327ED}"/>
+              </a:ext>
+            </a:extLst>
+          </p:cNvPr>
+          <p:cNvSpPr/>
+          <p:nvPr/>
+        </p:nvSpPr>
+        <p:spPr>
+          <a:xfrm>
+            <a:off x="985421" y="1580225"/>
+            <a:ext cx="10271464" cy="4092606"/>
+          </a:xfrm>
+          <a:prstGeom prst="rect">
+            <a:avLst/>
+          </a:prstGeom>
+          <a:noFill/>
+          <a:ln w="76200"/>
+        </p:spPr>
+        <p:style>
+          <a:lnRef idx="2">
+            <a:schemeClr val="accent5"/>
+          </a:lnRef>
+          <a:fillRef idx="1">
+            <a:schemeClr val="lt1"/>
+          </a:fillRef>
+          <a:effectRef idx="0">
+            <a:schemeClr val="accent5"/>
+          </a:effectRef>
+          <a:fontRef idx="minor">
+            <a:schemeClr val="dk1"/>
+          </a:fontRef>
+        </p:style>
+        <p:txBody>
+          <a:bodyPr rtlCol="0" anchor="ctr"/>
+          <a:lstStyle/>
+          <a:p>
+            <a:pPr algn="ctr"/>
+            <a:endParaRPr lang="en-US"/>
+          </a:p>
+        </p:txBody>
+      </p:sp>
+      <p:sp>
+        <p:nvSpPr>
+          <p:cNvPr id="6" name="Rectangle 5">
+            <a:extLst>
+              <a:ext uri="{FF2B5EF4-FFF2-40B4-BE49-F238E27FC236}">
+                <a16:creationId xmlns:a16="http://schemas.microsoft.com/office/drawing/2014/main" id="{7D1FD5F6-09CE-6654-44FF-6A029C7012CF}"/>
+              </a:ext>
+            </a:extLst>
+          </p:cNvPr>
+          <p:cNvSpPr/>
+          <p:nvPr/>
+        </p:nvSpPr>
+        <p:spPr>
+          <a:xfrm>
+            <a:off x="1191087" y="2060020"/>
+            <a:ext cx="2670700" cy="389138"/>
+          </a:xfrm>
+          <a:prstGeom prst="rect">
+            <a:avLst/>
+          </a:prstGeom>
+          <a:noFill/>
+          <a:ln w="38100"/>
+        </p:spPr>
+        <p:style>
+          <a:lnRef idx="2">
+            <a:schemeClr val="accent5"/>
+          </a:lnRef>
+          <a:fillRef idx="1">
+            <a:schemeClr val="lt1"/>
+          </a:fillRef>
+          <a:effectRef idx="0">
+            <a:schemeClr val="accent5"/>
+          </a:effectRef>
+          <a:fontRef idx="minor">
+            <a:schemeClr val="dk1"/>
+          </a:fontRef>
+        </p:style>
+        <p:txBody>
+          <a:bodyPr rtlCol="0" anchor="ctr"/>
+          <a:lstStyle/>
+          <a:p>
+            <a:pPr algn="ctr"/>
+            <a:endParaRPr lang="en-US"/>
+          </a:p>
+        </p:txBody>
+      </p:sp>
+      <p:sp>
+        <p:nvSpPr>
+          <p:cNvPr id="7" name="TextBox 6">
+            <a:extLst>
+              <a:ext uri="{FF2B5EF4-FFF2-40B4-BE49-F238E27FC236}">
+                <a16:creationId xmlns:a16="http://schemas.microsoft.com/office/drawing/2014/main" id="{8EEF32A2-87D7-2481-5D08-F530F14B3DC3}"/>
+              </a:ext>
+            </a:extLst>
+          </p:cNvPr>
+          <p:cNvSpPr txBox="1"/>
+          <p:nvPr/>
+        </p:nvSpPr>
+        <p:spPr>
+          <a:xfrm>
+            <a:off x="1075676" y="1690688"/>
+            <a:ext cx="2049263" cy="369332"/>
+          </a:xfrm>
+          <a:prstGeom prst="rect">
+            <a:avLst/>
+          </a:prstGeom>
+          <a:noFill/>
+        </p:spPr>
+        <p:txBody>
+          <a:bodyPr wrap="square" rtlCol="0">
+            <a:spAutoFit/>
+          </a:bodyPr>
+          <a:lstStyle/>
+          <a:p>
+            <a:r>
+              <a:rPr lang="en-US" dirty="0"/>
+              <a:t>Organization Name</a:t>
+            </a:r>
+          </a:p>
+        </p:txBody>
+      </p:sp>
+      <p:sp>
+        <p:nvSpPr>
+          <p:cNvPr id="8" name="TextBox 7">
+            <a:extLst>
+              <a:ext uri="{FF2B5EF4-FFF2-40B4-BE49-F238E27FC236}">
+                <a16:creationId xmlns:a16="http://schemas.microsoft.com/office/drawing/2014/main" id="{74E5BB67-7D75-8070-754B-FD3C65B837BE}"/>
+              </a:ext>
+            </a:extLst>
+          </p:cNvPr>
+          <p:cNvSpPr txBox="1"/>
+          <p:nvPr/>
+        </p:nvSpPr>
+        <p:spPr>
+          <a:xfrm>
+            <a:off x="1299599" y="2100700"/>
+            <a:ext cx="2222853" cy="307777"/>
+          </a:xfrm>
+          <a:prstGeom prst="rect">
+            <a:avLst/>
+          </a:prstGeom>
+          <a:noFill/>
+        </p:spPr>
+        <p:txBody>
+          <a:bodyPr wrap="none" rtlCol="0">
+            <a:spAutoFit/>
+          </a:bodyPr>
+          <a:lstStyle/>
+          <a:p>
+            <a:r>
+              <a:rPr lang="en-US" sz="1400" i="1" dirty="0"/>
+              <a:t>Acme Provider Organization</a:t>
+            </a:r>
+          </a:p>
+        </p:txBody>
+      </p:sp>
+      <p:sp>
+        <p:nvSpPr>
+          <p:cNvPr id="9" name="Rectangle 8">
+            <a:extLst>
+              <a:ext uri="{FF2B5EF4-FFF2-40B4-BE49-F238E27FC236}">
+                <a16:creationId xmlns:a16="http://schemas.microsoft.com/office/drawing/2014/main" id="{8790510D-E3DD-9B67-0992-030EC8C6EB38}"/>
+              </a:ext>
+            </a:extLst>
+          </p:cNvPr>
+          <p:cNvSpPr/>
+          <p:nvPr/>
+        </p:nvSpPr>
+        <p:spPr>
+          <a:xfrm>
+            <a:off x="4009008" y="2060020"/>
+            <a:ext cx="2670700" cy="389138"/>
+          </a:xfrm>
+          <a:prstGeom prst="rect">
+            <a:avLst/>
+          </a:prstGeom>
+          <a:noFill/>
+          <a:ln w="38100"/>
+        </p:spPr>
+        <p:style>
+          <a:lnRef idx="2">
+            <a:schemeClr val="accent5"/>
+          </a:lnRef>
+          <a:fillRef idx="1">
+            <a:schemeClr val="lt1"/>
+          </a:fillRef>
+          <a:effectRef idx="0">
+            <a:schemeClr val="accent5"/>
+          </a:effectRef>
+          <a:fontRef idx="minor">
+            <a:schemeClr val="dk1"/>
+          </a:fontRef>
+        </p:style>
+        <p:txBody>
+          <a:bodyPr rtlCol="0" anchor="ctr"/>
+          <a:lstStyle/>
+          <a:p>
+            <a:pPr algn="ctr"/>
+            <a:endParaRPr lang="en-US"/>
+          </a:p>
+        </p:txBody>
+      </p:sp>
+      <p:sp>
+        <p:nvSpPr>
+          <p:cNvPr id="10" name="TextBox 9">
+            <a:extLst>
+              <a:ext uri="{FF2B5EF4-FFF2-40B4-BE49-F238E27FC236}">
+                <a16:creationId xmlns:a16="http://schemas.microsoft.com/office/drawing/2014/main" id="{43FC2E3C-5C1E-1B96-9F8B-1D8370F2A5ED}"/>
+              </a:ext>
+            </a:extLst>
+          </p:cNvPr>
+          <p:cNvSpPr txBox="1"/>
+          <p:nvPr/>
+        </p:nvSpPr>
+        <p:spPr>
+          <a:xfrm>
+            <a:off x="3893597" y="1690688"/>
+            <a:ext cx="2049263" cy="369332"/>
+          </a:xfrm>
+          <a:prstGeom prst="rect">
+            <a:avLst/>
+          </a:prstGeom>
+          <a:noFill/>
+        </p:spPr>
+        <p:txBody>
+          <a:bodyPr wrap="square" rtlCol="0">
+            <a:spAutoFit/>
+          </a:bodyPr>
+          <a:lstStyle/>
+          <a:p>
+            <a:r>
+              <a:rPr lang="en-US" dirty="0"/>
+              <a:t>Location Name</a:t>
+            </a:r>
+          </a:p>
+        </p:txBody>
+      </p:sp>
+      <p:sp>
+        <p:nvSpPr>
+          <p:cNvPr id="11" name="TextBox 10">
+            <a:extLst>
+              <a:ext uri="{FF2B5EF4-FFF2-40B4-BE49-F238E27FC236}">
+                <a16:creationId xmlns:a16="http://schemas.microsoft.com/office/drawing/2014/main" id="{1B188748-8CD2-A488-D575-3FD888DB7C84}"/>
+              </a:ext>
+            </a:extLst>
+          </p:cNvPr>
+          <p:cNvSpPr txBox="1"/>
+          <p:nvPr/>
+        </p:nvSpPr>
+        <p:spPr>
+          <a:xfrm>
+            <a:off x="4117520" y="2100700"/>
+            <a:ext cx="1053494" cy="307777"/>
+          </a:xfrm>
+          <a:prstGeom prst="rect">
+            <a:avLst/>
+          </a:prstGeom>
+          <a:noFill/>
+        </p:spPr>
+        <p:txBody>
+          <a:bodyPr wrap="none" rtlCol="0">
+            <a:spAutoFit/>
+          </a:bodyPr>
+          <a:lstStyle/>
+          <a:p>
+            <a:r>
+              <a:rPr lang="en-US" sz="1400" i="1" dirty="0"/>
+              <a:t>Acme North</a:t>
+            </a:r>
+          </a:p>
+        </p:txBody>
+      </p:sp>
+      <p:sp>
+        <p:nvSpPr>
+          <p:cNvPr id="12" name="Rectangle 11">
+            <a:extLst>
+              <a:ext uri="{FF2B5EF4-FFF2-40B4-BE49-F238E27FC236}">
+                <a16:creationId xmlns:a16="http://schemas.microsoft.com/office/drawing/2014/main" id="{705A3C46-8BB3-CCC1-D0CC-2B33E3B7A733}"/>
+              </a:ext>
+            </a:extLst>
+          </p:cNvPr>
+          <p:cNvSpPr/>
+          <p:nvPr/>
+        </p:nvSpPr>
+        <p:spPr>
+          <a:xfrm>
+            <a:off x="6781803" y="2060020"/>
+            <a:ext cx="2670700" cy="389138"/>
+          </a:xfrm>
+          <a:prstGeom prst="rect">
+            <a:avLst/>
+          </a:prstGeom>
+          <a:noFill/>
+          <a:ln w="38100"/>
+        </p:spPr>
+        <p:style>
+          <a:lnRef idx="2">
+            <a:schemeClr val="accent5"/>
+          </a:lnRef>
+          <a:fillRef idx="1">
+            <a:schemeClr val="lt1"/>
+          </a:fillRef>
+          <a:effectRef idx="0">
+            <a:schemeClr val="accent5"/>
+          </a:effectRef>
+          <a:fontRef idx="minor">
+            <a:schemeClr val="dk1"/>
+          </a:fontRef>
+        </p:style>
+        <p:txBody>
+          <a:bodyPr rtlCol="0" anchor="ctr"/>
+          <a:lstStyle/>
+          <a:p>
+            <a:pPr algn="ctr"/>
+            <a:endParaRPr lang="en-US"/>
+          </a:p>
+        </p:txBody>
+      </p:sp>
+      <p:sp>
+        <p:nvSpPr>
+          <p:cNvPr id="13" name="TextBox 12">
+            <a:extLst>
+              <a:ext uri="{FF2B5EF4-FFF2-40B4-BE49-F238E27FC236}">
+                <a16:creationId xmlns:a16="http://schemas.microsoft.com/office/drawing/2014/main" id="{8DA9CEE6-40CB-BF07-FF34-BCD58DBA33D2}"/>
+              </a:ext>
+            </a:extLst>
+          </p:cNvPr>
+          <p:cNvSpPr txBox="1"/>
+          <p:nvPr/>
+        </p:nvSpPr>
+        <p:spPr>
+          <a:xfrm>
+            <a:off x="6666392" y="1690688"/>
+            <a:ext cx="2049263" cy="369332"/>
+          </a:xfrm>
+          <a:prstGeom prst="rect">
+            <a:avLst/>
+          </a:prstGeom>
+          <a:noFill/>
+        </p:spPr>
+        <p:txBody>
+          <a:bodyPr wrap="square" rtlCol="0">
+            <a:spAutoFit/>
+          </a:bodyPr>
+          <a:lstStyle/>
+          <a:p>
+            <a:r>
+              <a:rPr lang="en-US" dirty="0"/>
+              <a:t>Measure</a:t>
+            </a:r>
+          </a:p>
+        </p:txBody>
+      </p:sp>
+      <p:sp>
+        <p:nvSpPr>
+          <p:cNvPr id="14" name="TextBox 13">
+            <a:extLst>
+              <a:ext uri="{FF2B5EF4-FFF2-40B4-BE49-F238E27FC236}">
+                <a16:creationId xmlns:a16="http://schemas.microsoft.com/office/drawing/2014/main" id="{264724DF-A58C-F16D-F5F6-A5D6CFF0332F}"/>
+              </a:ext>
+            </a:extLst>
+          </p:cNvPr>
+          <p:cNvSpPr txBox="1"/>
+          <p:nvPr/>
+        </p:nvSpPr>
+        <p:spPr>
+          <a:xfrm>
+            <a:off x="6890315" y="2100700"/>
+            <a:ext cx="2374240" cy="307777"/>
+          </a:xfrm>
+          <a:prstGeom prst="rect">
+            <a:avLst/>
+          </a:prstGeom>
+          <a:noFill/>
+        </p:spPr>
+        <p:txBody>
+          <a:bodyPr wrap="none" rtlCol="0">
+            <a:spAutoFit/>
+          </a:bodyPr>
+          <a:lstStyle/>
+          <a:p>
+            <a:r>
+              <a:rPr lang="en-US" sz="1400" i="1" dirty="0"/>
+              <a:t>Discharged on Antithrombotic</a:t>
+            </a:r>
+          </a:p>
+        </p:txBody>
+      </p:sp>
+      <p:sp>
+        <p:nvSpPr>
+          <p:cNvPr id="15" name="Rectangle 14">
+            <a:extLst>
+              <a:ext uri="{FF2B5EF4-FFF2-40B4-BE49-F238E27FC236}">
+                <a16:creationId xmlns:a16="http://schemas.microsoft.com/office/drawing/2014/main" id="{307BF473-2B3F-61FB-8AF1-52A80F2E4BF6}"/>
+              </a:ext>
+            </a:extLst>
+          </p:cNvPr>
+          <p:cNvSpPr/>
+          <p:nvPr/>
+        </p:nvSpPr>
+        <p:spPr>
+          <a:xfrm>
+            <a:off x="9567914" y="2060020"/>
+            <a:ext cx="1548410" cy="389138"/>
+          </a:xfrm>
+          <a:prstGeom prst="rect">
+            <a:avLst/>
+          </a:prstGeom>
+          <a:noFill/>
+          <a:ln w="38100"/>
+        </p:spPr>
+        <p:style>
+          <a:lnRef idx="2">
+            <a:schemeClr val="accent5"/>
+          </a:lnRef>
+          <a:fillRef idx="1">
+            <a:schemeClr val="lt1"/>
+          </a:fillRef>
+          <a:effectRef idx="0">
+            <a:schemeClr val="accent5"/>
+          </a:effectRef>
+          <a:fontRef idx="minor">
+            <a:schemeClr val="dk1"/>
+          </a:fontRef>
+        </p:style>
+        <p:txBody>
+          <a:bodyPr rtlCol="0" anchor="ctr"/>
+          <a:lstStyle/>
+          <a:p>
+            <a:pPr algn="ctr"/>
+            <a:endParaRPr lang="en-US"/>
+          </a:p>
+        </p:txBody>
+      </p:sp>
+      <p:sp>
+        <p:nvSpPr>
+          <p:cNvPr id="16" name="TextBox 15">
+            <a:extLst>
+              <a:ext uri="{FF2B5EF4-FFF2-40B4-BE49-F238E27FC236}">
+                <a16:creationId xmlns:a16="http://schemas.microsoft.com/office/drawing/2014/main" id="{8F106C94-2839-CA6A-2F26-E10377AA9F3E}"/>
+              </a:ext>
+            </a:extLst>
+          </p:cNvPr>
+          <p:cNvSpPr txBox="1"/>
+          <p:nvPr/>
+        </p:nvSpPr>
+        <p:spPr>
+          <a:xfrm>
+            <a:off x="9452503" y="1690688"/>
+            <a:ext cx="2049263" cy="369332"/>
+          </a:xfrm>
+          <a:prstGeom prst="rect">
+            <a:avLst/>
+          </a:prstGeom>
+          <a:noFill/>
+        </p:spPr>
+        <p:txBody>
+          <a:bodyPr wrap="square" rtlCol="0">
+            <a:spAutoFit/>
+          </a:bodyPr>
+          <a:lstStyle/>
+          <a:p>
+            <a:r>
+              <a:rPr lang="en-US" dirty="0"/>
+              <a:t>Period</a:t>
+            </a:r>
+          </a:p>
+        </p:txBody>
+      </p:sp>
+      <p:sp>
+        <p:nvSpPr>
+          <p:cNvPr id="17" name="TextBox 16">
+            <a:extLst>
+              <a:ext uri="{FF2B5EF4-FFF2-40B4-BE49-F238E27FC236}">
+                <a16:creationId xmlns:a16="http://schemas.microsoft.com/office/drawing/2014/main" id="{D46676C6-A73F-38BC-1952-3665D0E599FF}"/>
+              </a:ext>
+            </a:extLst>
+          </p:cNvPr>
+          <p:cNvSpPr txBox="1"/>
+          <p:nvPr/>
+        </p:nvSpPr>
+        <p:spPr>
+          <a:xfrm>
+            <a:off x="9676426" y="2100700"/>
+            <a:ext cx="394660" cy="307777"/>
+          </a:xfrm>
+          <a:prstGeom prst="rect">
+            <a:avLst/>
+          </a:prstGeom>
+          <a:noFill/>
+        </p:spPr>
+        <p:txBody>
+          <a:bodyPr wrap="none" rtlCol="0">
+            <a:spAutoFit/>
+          </a:bodyPr>
+          <a:lstStyle/>
+          <a:p>
+            <a:r>
+              <a:rPr lang="en-US" sz="1400" i="1" dirty="0"/>
+              <a:t>Q1</a:t>
+            </a:r>
+          </a:p>
+        </p:txBody>
+      </p:sp>
+      <p:sp>
+        <p:nvSpPr>
+          <p:cNvPr id="23" name="Rectangle 22">
+            <a:extLst>
+              <a:ext uri="{FF2B5EF4-FFF2-40B4-BE49-F238E27FC236}">
+                <a16:creationId xmlns:a16="http://schemas.microsoft.com/office/drawing/2014/main" id="{77693CEF-21DC-D8CE-A5C2-48A765E04034}"/>
+              </a:ext>
+            </a:extLst>
+          </p:cNvPr>
+          <p:cNvSpPr/>
+          <p:nvPr/>
+        </p:nvSpPr>
+        <p:spPr>
+          <a:xfrm>
+            <a:off x="1191087" y="2846561"/>
+            <a:ext cx="2926433" cy="2040807"/>
+          </a:xfrm>
+          <a:prstGeom prst="rect">
+            <a:avLst/>
+          </a:prstGeom>
+          <a:noFill/>
+          <a:ln w="38100"/>
+        </p:spPr>
+        <p:style>
+          <a:lnRef idx="2">
+            <a:schemeClr val="accent5"/>
+          </a:lnRef>
+          <a:fillRef idx="1">
+            <a:schemeClr val="lt1"/>
+          </a:fillRef>
+          <a:effectRef idx="0">
+            <a:schemeClr val="accent5"/>
+          </a:effectRef>
+          <a:fontRef idx="minor">
+            <a:schemeClr val="dk1"/>
+          </a:fontRef>
+        </p:style>
+        <p:txBody>
+          <a:bodyPr rtlCol="0" anchor="ctr"/>
+          <a:lstStyle/>
+          <a:p>
+            <a:pPr algn="ctr"/>
+            <a:endParaRPr lang="en-US" b="1" dirty="0"/>
+          </a:p>
+        </p:txBody>
+      </p:sp>
+      <p:sp>
+        <p:nvSpPr>
+          <p:cNvPr id="32" name="TextBox 31">
+            <a:extLst>
+              <a:ext uri="{FF2B5EF4-FFF2-40B4-BE49-F238E27FC236}">
+                <a16:creationId xmlns:a16="http://schemas.microsoft.com/office/drawing/2014/main" id="{6B6CE0EF-DCBF-F2FA-842A-AE9887BB4A61}"/>
+              </a:ext>
+            </a:extLst>
+          </p:cNvPr>
+          <p:cNvSpPr txBox="1"/>
+          <p:nvPr/>
+        </p:nvSpPr>
+        <p:spPr>
+          <a:xfrm>
+            <a:off x="1054899" y="2491176"/>
+            <a:ext cx="2049263" cy="369332"/>
+          </a:xfrm>
+          <a:prstGeom prst="rect">
+            <a:avLst/>
+          </a:prstGeom>
+          <a:noFill/>
+        </p:spPr>
+        <p:txBody>
+          <a:bodyPr wrap="square" rtlCol="0">
+            <a:spAutoFit/>
+          </a:bodyPr>
+          <a:lstStyle/>
+          <a:p>
+            <a:r>
+              <a:rPr lang="en-US" dirty="0"/>
+              <a:t>Score</a:t>
+            </a:r>
+          </a:p>
+        </p:txBody>
+      </p:sp>
+      <p:sp>
+        <p:nvSpPr>
+          <p:cNvPr id="34" name="TextBox 33">
+            <a:extLst>
+              <a:ext uri="{FF2B5EF4-FFF2-40B4-BE49-F238E27FC236}">
+                <a16:creationId xmlns:a16="http://schemas.microsoft.com/office/drawing/2014/main" id="{F4D7E810-BA21-590A-61BF-720D2B3D7E81}"/>
+              </a:ext>
+            </a:extLst>
+          </p:cNvPr>
+          <p:cNvSpPr txBox="1"/>
+          <p:nvPr/>
+        </p:nvSpPr>
+        <p:spPr>
+          <a:xfrm>
+            <a:off x="1249041" y="2907056"/>
+            <a:ext cx="1429815" cy="307777"/>
+          </a:xfrm>
+          <a:prstGeom prst="rect">
+            <a:avLst/>
+          </a:prstGeom>
+          <a:noFill/>
+        </p:spPr>
+        <p:txBody>
+          <a:bodyPr wrap="none" rtlCol="0">
+            <a:spAutoFit/>
+          </a:bodyPr>
+          <a:lstStyle/>
+          <a:p>
+            <a:r>
+              <a:rPr lang="en-US" sz="1400" i="1" dirty="0"/>
+              <a:t>Initial Population</a:t>
+            </a:r>
+          </a:p>
+        </p:txBody>
+      </p:sp>
+      <p:sp>
+        <p:nvSpPr>
+          <p:cNvPr id="35" name="TextBox 34">
+            <a:extLst>
+              <a:ext uri="{FF2B5EF4-FFF2-40B4-BE49-F238E27FC236}">
+                <a16:creationId xmlns:a16="http://schemas.microsoft.com/office/drawing/2014/main" id="{FB0605AD-49F8-745F-797D-D0CBF07630EE}"/>
+              </a:ext>
+            </a:extLst>
+          </p:cNvPr>
+          <p:cNvSpPr txBox="1"/>
+          <p:nvPr/>
+        </p:nvSpPr>
+        <p:spPr>
+          <a:xfrm>
+            <a:off x="1249040" y="3232748"/>
+            <a:ext cx="1145891" cy="307777"/>
+          </a:xfrm>
+          <a:prstGeom prst="rect">
+            <a:avLst/>
+          </a:prstGeom>
+          <a:noFill/>
+        </p:spPr>
+        <p:txBody>
+          <a:bodyPr wrap="none" rtlCol="0">
+            <a:spAutoFit/>
+          </a:bodyPr>
+          <a:lstStyle/>
+          <a:p>
+            <a:r>
+              <a:rPr lang="en-US" sz="1400" i="1" dirty="0"/>
+              <a:t>Denominator</a:t>
+            </a:r>
+          </a:p>
+        </p:txBody>
+      </p:sp>
+      <p:sp>
+        <p:nvSpPr>
+          <p:cNvPr id="36" name="TextBox 35">
+            <a:extLst>
+              <a:ext uri="{FF2B5EF4-FFF2-40B4-BE49-F238E27FC236}">
+                <a16:creationId xmlns:a16="http://schemas.microsoft.com/office/drawing/2014/main" id="{4041D3E9-53F3-7165-740A-DDD54D6CFE1F}"/>
+              </a:ext>
+            </a:extLst>
+          </p:cNvPr>
+          <p:cNvSpPr txBox="1"/>
+          <p:nvPr/>
+        </p:nvSpPr>
+        <p:spPr>
+          <a:xfrm>
+            <a:off x="1249039" y="3559597"/>
+            <a:ext cx="1855123" cy="307777"/>
+          </a:xfrm>
+          <a:prstGeom prst="rect">
+            <a:avLst/>
+          </a:prstGeom>
+          <a:noFill/>
+        </p:spPr>
+        <p:txBody>
+          <a:bodyPr wrap="none" rtlCol="0">
+            <a:spAutoFit/>
+          </a:bodyPr>
+          <a:lstStyle/>
+          <a:p>
+            <a:r>
+              <a:rPr lang="en-US" sz="1400" i="1" dirty="0"/>
+              <a:t>Denominator Exclusion</a:t>
+            </a:r>
+          </a:p>
+        </p:txBody>
+      </p:sp>
+      <p:sp>
+        <p:nvSpPr>
+          <p:cNvPr id="37" name="TextBox 36">
+            <a:extLst>
+              <a:ext uri="{FF2B5EF4-FFF2-40B4-BE49-F238E27FC236}">
+                <a16:creationId xmlns:a16="http://schemas.microsoft.com/office/drawing/2014/main" id="{41CF38BC-EB72-5F01-DAEE-A2E5A7673C0E}"/>
+              </a:ext>
+            </a:extLst>
+          </p:cNvPr>
+          <p:cNvSpPr txBox="1"/>
+          <p:nvPr/>
+        </p:nvSpPr>
+        <p:spPr>
+          <a:xfrm>
+            <a:off x="1249040" y="3875220"/>
+            <a:ext cx="1886863" cy="307777"/>
+          </a:xfrm>
+          <a:prstGeom prst="rect">
+            <a:avLst/>
+          </a:prstGeom>
+          <a:noFill/>
+        </p:spPr>
+        <p:txBody>
+          <a:bodyPr wrap="none" rtlCol="0">
+            <a:spAutoFit/>
+          </a:bodyPr>
+          <a:lstStyle/>
+          <a:p>
+            <a:r>
+              <a:rPr lang="en-US" sz="1400" i="1" dirty="0"/>
+              <a:t>Denominator Exception</a:t>
+            </a:r>
+          </a:p>
+        </p:txBody>
+      </p:sp>
+      <p:sp>
+        <p:nvSpPr>
+          <p:cNvPr id="38" name="TextBox 37">
+            <a:extLst>
+              <a:ext uri="{FF2B5EF4-FFF2-40B4-BE49-F238E27FC236}">
+                <a16:creationId xmlns:a16="http://schemas.microsoft.com/office/drawing/2014/main" id="{D98453F1-F5D1-B883-9021-F1CA7327E907}"/>
+              </a:ext>
+            </a:extLst>
+          </p:cNvPr>
+          <p:cNvSpPr txBox="1"/>
+          <p:nvPr/>
+        </p:nvSpPr>
+        <p:spPr>
+          <a:xfrm>
+            <a:off x="1249039" y="4212138"/>
+            <a:ext cx="985591" cy="307777"/>
+          </a:xfrm>
+          <a:prstGeom prst="rect">
+            <a:avLst/>
+          </a:prstGeom>
+          <a:noFill/>
+        </p:spPr>
+        <p:txBody>
+          <a:bodyPr wrap="none" rtlCol="0">
+            <a:spAutoFit/>
+          </a:bodyPr>
+          <a:lstStyle/>
+          <a:p>
+            <a:r>
+              <a:rPr lang="en-US" sz="1400" i="1" dirty="0"/>
+              <a:t>Numerator</a:t>
+            </a:r>
+          </a:p>
+        </p:txBody>
+      </p:sp>
+      <p:sp>
+        <p:nvSpPr>
+          <p:cNvPr id="39" name="TextBox 38">
+            <a:extLst>
+              <a:ext uri="{FF2B5EF4-FFF2-40B4-BE49-F238E27FC236}">
+                <a16:creationId xmlns:a16="http://schemas.microsoft.com/office/drawing/2014/main" id="{321320D3-BFB9-CE3B-304A-1EB6CCEF070C}"/>
+              </a:ext>
+            </a:extLst>
+          </p:cNvPr>
+          <p:cNvSpPr txBox="1"/>
+          <p:nvPr/>
+        </p:nvSpPr>
+        <p:spPr>
+          <a:xfrm>
+            <a:off x="3328639" y="2907056"/>
+            <a:ext cx="458780" cy="307777"/>
+          </a:xfrm>
+          <a:prstGeom prst="rect">
+            <a:avLst/>
+          </a:prstGeom>
+          <a:noFill/>
+        </p:spPr>
+        <p:txBody>
+          <a:bodyPr wrap="none" rtlCol="0">
+            <a:spAutoFit/>
+          </a:bodyPr>
+          <a:lstStyle/>
+          <a:p>
+            <a:r>
+              <a:rPr lang="en-US" sz="1400" i="1" dirty="0"/>
+              <a:t>200</a:t>
+            </a:r>
+          </a:p>
+        </p:txBody>
+      </p:sp>
+      <p:sp>
+        <p:nvSpPr>
+          <p:cNvPr id="40" name="TextBox 39">
+            <a:extLst>
+              <a:ext uri="{FF2B5EF4-FFF2-40B4-BE49-F238E27FC236}">
+                <a16:creationId xmlns:a16="http://schemas.microsoft.com/office/drawing/2014/main" id="{2A7CB533-FA27-48FD-6495-9A183784C265}"/>
+              </a:ext>
+            </a:extLst>
+          </p:cNvPr>
+          <p:cNvSpPr txBox="1"/>
+          <p:nvPr/>
+        </p:nvSpPr>
+        <p:spPr>
+          <a:xfrm>
+            <a:off x="3304338" y="3232748"/>
+            <a:ext cx="458780" cy="307777"/>
+          </a:xfrm>
+          <a:prstGeom prst="rect">
+            <a:avLst/>
+          </a:prstGeom>
+          <a:noFill/>
+        </p:spPr>
+        <p:txBody>
+          <a:bodyPr wrap="none" rtlCol="0">
+            <a:spAutoFit/>
+          </a:bodyPr>
+          <a:lstStyle/>
+          <a:p>
+            <a:r>
+              <a:rPr lang="en-US" sz="1400" i="1" dirty="0"/>
+              <a:t>100</a:t>
+            </a:r>
+          </a:p>
+        </p:txBody>
+      </p:sp>
+      <p:sp>
+        <p:nvSpPr>
+          <p:cNvPr id="41" name="TextBox 40">
+            <a:extLst>
+              <a:ext uri="{FF2B5EF4-FFF2-40B4-BE49-F238E27FC236}">
+                <a16:creationId xmlns:a16="http://schemas.microsoft.com/office/drawing/2014/main" id="{3D918205-1856-AE0E-7DF5-4B4374A8C5FB}"/>
+              </a:ext>
+            </a:extLst>
+          </p:cNvPr>
+          <p:cNvSpPr txBox="1"/>
+          <p:nvPr/>
+        </p:nvSpPr>
+        <p:spPr>
+          <a:xfrm>
+            <a:off x="3374325" y="3558440"/>
+            <a:ext cx="367408" cy="307777"/>
+          </a:xfrm>
+          <a:prstGeom prst="rect">
+            <a:avLst/>
+          </a:prstGeom>
+          <a:noFill/>
+        </p:spPr>
+        <p:txBody>
+          <a:bodyPr wrap="none" rtlCol="0">
+            <a:spAutoFit/>
+          </a:bodyPr>
+          <a:lstStyle/>
+          <a:p>
+            <a:r>
+              <a:rPr lang="en-US" sz="1400" i="1" dirty="0"/>
+              <a:t>10</a:t>
+            </a:r>
+          </a:p>
+        </p:txBody>
+      </p:sp>
+      <p:sp>
+        <p:nvSpPr>
+          <p:cNvPr id="42" name="TextBox 41">
+            <a:extLst>
+              <a:ext uri="{FF2B5EF4-FFF2-40B4-BE49-F238E27FC236}">
+                <a16:creationId xmlns:a16="http://schemas.microsoft.com/office/drawing/2014/main" id="{A5F2C3EB-3BE4-84A4-C4DE-1F2BEBEF5FD7}"/>
+              </a:ext>
+            </a:extLst>
+          </p:cNvPr>
+          <p:cNvSpPr txBox="1"/>
+          <p:nvPr/>
+        </p:nvSpPr>
+        <p:spPr>
+          <a:xfrm>
+            <a:off x="3465695" y="3905469"/>
+            <a:ext cx="276038" cy="307777"/>
+          </a:xfrm>
+          <a:prstGeom prst="rect">
+            <a:avLst/>
+          </a:prstGeom>
+          <a:noFill/>
+        </p:spPr>
+        <p:txBody>
+          <a:bodyPr wrap="none" rtlCol="0">
+            <a:spAutoFit/>
+          </a:bodyPr>
+          <a:lstStyle/>
+          <a:p>
+            <a:r>
+              <a:rPr lang="en-US" sz="1400" i="1" dirty="0"/>
+              <a:t>0</a:t>
+            </a:r>
+          </a:p>
+        </p:txBody>
+      </p:sp>
+      <p:sp>
+        <p:nvSpPr>
+          <p:cNvPr id="43" name="TextBox 42">
+            <a:extLst>
+              <a:ext uri="{FF2B5EF4-FFF2-40B4-BE49-F238E27FC236}">
+                <a16:creationId xmlns:a16="http://schemas.microsoft.com/office/drawing/2014/main" id="{CE5A01B6-195A-813C-C826-EC6983E7597C}"/>
+              </a:ext>
+            </a:extLst>
+          </p:cNvPr>
+          <p:cNvSpPr txBox="1"/>
+          <p:nvPr/>
+        </p:nvSpPr>
+        <p:spPr>
+          <a:xfrm>
+            <a:off x="3374325" y="4255303"/>
+            <a:ext cx="367408" cy="307777"/>
+          </a:xfrm>
+          <a:prstGeom prst="rect">
+            <a:avLst/>
+          </a:prstGeom>
+          <a:noFill/>
+        </p:spPr>
+        <p:txBody>
+          <a:bodyPr wrap="none" rtlCol="0">
+            <a:spAutoFit/>
+          </a:bodyPr>
+          <a:lstStyle/>
+          <a:p>
+            <a:r>
+              <a:rPr lang="en-US" sz="1400" i="1" dirty="0"/>
+              <a:t>40</a:t>
+            </a:r>
+          </a:p>
+        </p:txBody>
+      </p:sp>
+      <p:sp>
+        <p:nvSpPr>
+          <p:cNvPr id="44" name="TextBox 43">
+            <a:extLst>
+              <a:ext uri="{FF2B5EF4-FFF2-40B4-BE49-F238E27FC236}">
+                <a16:creationId xmlns:a16="http://schemas.microsoft.com/office/drawing/2014/main" id="{9F9A2768-6368-9D49-1A02-CCE73007B478}"/>
+              </a:ext>
+            </a:extLst>
+          </p:cNvPr>
+          <p:cNvSpPr txBox="1"/>
+          <p:nvPr/>
+        </p:nvSpPr>
+        <p:spPr>
+          <a:xfrm>
+            <a:off x="1260550" y="4546523"/>
+            <a:ext cx="577530" cy="307777"/>
+          </a:xfrm>
+          <a:prstGeom prst="rect">
+            <a:avLst/>
+          </a:prstGeom>
+          <a:noFill/>
+        </p:spPr>
+        <p:txBody>
+          <a:bodyPr wrap="none" rtlCol="0">
+            <a:spAutoFit/>
+          </a:bodyPr>
+          <a:lstStyle/>
+          <a:p>
+            <a:r>
+              <a:rPr lang="en-US" sz="1400" i="1" dirty="0"/>
+              <a:t>Score</a:t>
+            </a:r>
+          </a:p>
+        </p:txBody>
+      </p:sp>
+      <p:sp>
+        <p:nvSpPr>
+          <p:cNvPr id="45" name="TextBox 44">
+            <a:extLst>
+              <a:ext uri="{FF2B5EF4-FFF2-40B4-BE49-F238E27FC236}">
+                <a16:creationId xmlns:a16="http://schemas.microsoft.com/office/drawing/2014/main" id="{A24C48AB-A3FF-478D-35A0-ACB31B89349C}"/>
+              </a:ext>
+            </a:extLst>
+          </p:cNvPr>
+          <p:cNvSpPr txBox="1"/>
+          <p:nvPr/>
+        </p:nvSpPr>
+        <p:spPr>
+          <a:xfrm>
+            <a:off x="3012687" y="4579591"/>
+            <a:ext cx="723275" cy="307777"/>
+          </a:xfrm>
+          <a:prstGeom prst="rect">
+            <a:avLst/>
+          </a:prstGeom>
+          <a:noFill/>
+        </p:spPr>
+        <p:txBody>
+          <a:bodyPr wrap="none" rtlCol="0">
+            <a:spAutoFit/>
+          </a:bodyPr>
+          <a:lstStyle/>
+          <a:p>
+            <a:r>
+              <a:rPr lang="en-US" sz="1400" i="1" dirty="0"/>
+              <a:t>44.44%</a:t>
+            </a:r>
+          </a:p>
+        </p:txBody>
+      </p:sp>
+      <p:sp>
+        <p:nvSpPr>
+          <p:cNvPr id="46" name="Rectangle 45">
+            <a:extLst>
+              <a:ext uri="{FF2B5EF4-FFF2-40B4-BE49-F238E27FC236}">
+                <a16:creationId xmlns:a16="http://schemas.microsoft.com/office/drawing/2014/main" id="{1D8D6250-E8A3-96F2-9CBC-DBA65911D945}"/>
+              </a:ext>
+            </a:extLst>
+          </p:cNvPr>
+          <p:cNvSpPr/>
+          <p:nvPr/>
+        </p:nvSpPr>
+        <p:spPr>
+          <a:xfrm>
+            <a:off x="1963948" y="5111001"/>
+            <a:ext cx="1064263" cy="345921"/>
+          </a:xfrm>
+          <a:prstGeom prst="rect">
+            <a:avLst/>
+          </a:prstGeom>
+        </p:spPr>
+        <p:style>
+          <a:lnRef idx="2">
+            <a:schemeClr val="accent1">
+              <a:shade val="50000"/>
+            </a:schemeClr>
+          </a:lnRef>
+          <a:fillRef idx="1">
+            <a:schemeClr val="accent1"/>
+          </a:fillRef>
+          <a:effectRef idx="0">
+            <a:schemeClr val="accent1"/>
+          </a:effectRef>
+          <a:fontRef idx="minor">
+            <a:schemeClr val="lt1"/>
+          </a:fontRef>
+        </p:style>
+        <p:txBody>
+          <a:bodyPr rtlCol="0" anchor="ctr"/>
+          <a:lstStyle/>
+          <a:p>
+            <a:pPr algn="ctr"/>
+            <a:r>
+              <a:rPr lang="en-US" dirty="0"/>
+              <a:t>Submit</a:t>
+            </a:r>
+          </a:p>
+        </p:txBody>
+      </p:sp>
+    </p:spTree>
+    <p:extLst>
+      <p:ext uri="{BB962C8B-B14F-4D97-AF65-F5344CB8AC3E}">
+        <p14:creationId xmlns:p14="http://schemas.microsoft.com/office/powerpoint/2010/main" val="3473467270"/>
+      </p:ext>
+    </p:extLst>
+  </p:cSld>
+  <p:clrMapOvr>
+    <a:masterClrMapping/>
+  </p:clrMapOvr>
+</p:sld>
+</file>
+
 <file path=ppt/theme/theme1.xml><?xml version="1.0" encoding="utf-8"?>
 <a:theme xmlns:a="http://schemas.openxmlformats.org/drawingml/2006/main" name="Office Theme">
   <a:themeElements>

</xml_diff>